<commit_message>
minor updates to git slides
</commit_message>
<xml_diff>
--- a/slides/04_git_github.pptx
+++ b/slides/04_git_github.pptx
@@ -20,26 +20,27 @@
     <p:sldId id="298" r:id="rId14"/>
     <p:sldId id="288" r:id="rId15"/>
     <p:sldId id="265" r:id="rId16"/>
-    <p:sldId id="270" r:id="rId17"/>
-    <p:sldId id="272" r:id="rId18"/>
-    <p:sldId id="273" r:id="rId19"/>
-    <p:sldId id="274" r:id="rId20"/>
-    <p:sldId id="275" r:id="rId21"/>
-    <p:sldId id="285" r:id="rId22"/>
-    <p:sldId id="290" r:id="rId23"/>
-    <p:sldId id="291" r:id="rId24"/>
-    <p:sldId id="268" r:id="rId25"/>
-    <p:sldId id="276" r:id="rId26"/>
-    <p:sldId id="292" r:id="rId27"/>
-    <p:sldId id="277" r:id="rId28"/>
-    <p:sldId id="278" r:id="rId29"/>
-    <p:sldId id="282" r:id="rId30"/>
-    <p:sldId id="293" r:id="rId31"/>
-    <p:sldId id="294" r:id="rId32"/>
-    <p:sldId id="295" r:id="rId33"/>
-    <p:sldId id="296" r:id="rId34"/>
-    <p:sldId id="297" r:id="rId35"/>
-    <p:sldId id="281" r:id="rId36"/>
+    <p:sldId id="299" r:id="rId17"/>
+    <p:sldId id="270" r:id="rId18"/>
+    <p:sldId id="272" r:id="rId19"/>
+    <p:sldId id="273" r:id="rId20"/>
+    <p:sldId id="274" r:id="rId21"/>
+    <p:sldId id="275" r:id="rId22"/>
+    <p:sldId id="285" r:id="rId23"/>
+    <p:sldId id="290" r:id="rId24"/>
+    <p:sldId id="291" r:id="rId25"/>
+    <p:sldId id="268" r:id="rId26"/>
+    <p:sldId id="276" r:id="rId27"/>
+    <p:sldId id="292" r:id="rId28"/>
+    <p:sldId id="277" r:id="rId29"/>
+    <p:sldId id="278" r:id="rId30"/>
+    <p:sldId id="282" r:id="rId31"/>
+    <p:sldId id="293" r:id="rId32"/>
+    <p:sldId id="294" r:id="rId33"/>
+    <p:sldId id="295" r:id="rId34"/>
+    <p:sldId id="296" r:id="rId35"/>
+    <p:sldId id="297" r:id="rId36"/>
+    <p:sldId id="281" r:id="rId37"/>
   </p:sldIdLst>
   <p:sldSz cx="9144000" cy="6858000" type="screen4x3"/>
   <p:notesSz cx="6858000" cy="9144000"/>
@@ -323,7 +324,7 @@
             <a:fld id="{1D8BD707-D9CF-40AE-B4C6-C98DA3205C09}" type="datetimeFigureOut">
               <a:rPr lang="en-US" smtClean="0"/>
               <a:pPr/>
-              <a:t>12/22/2014</a:t>
+              <a:t>1/8/2015</a:t>
             </a:fld>
             <a:endParaRPr lang="en-US"/>
           </a:p>
@@ -497,7 +498,7 @@
             <a:fld id="{1D8BD707-D9CF-40AE-B4C6-C98DA3205C09}" type="datetimeFigureOut">
               <a:rPr lang="en-US" smtClean="0"/>
               <a:pPr/>
-              <a:t>12/22/2014</a:t>
+              <a:t>1/8/2015</a:t>
             </a:fld>
             <a:endParaRPr lang="en-US"/>
           </a:p>
@@ -674,7 +675,7 @@
             <a:fld id="{1D8BD707-D9CF-40AE-B4C6-C98DA3205C09}" type="datetimeFigureOut">
               <a:rPr lang="en-US" smtClean="0"/>
               <a:pPr/>
-              <a:t>12/22/2014</a:t>
+              <a:t>1/8/2015</a:t>
             </a:fld>
             <a:endParaRPr lang="en-US"/>
           </a:p>
@@ -841,7 +842,7 @@
             <a:fld id="{1D8BD707-D9CF-40AE-B4C6-C98DA3205C09}" type="datetimeFigureOut">
               <a:rPr lang="en-US" smtClean="0"/>
               <a:pPr/>
-              <a:t>12/22/2014</a:t>
+              <a:t>1/8/2015</a:t>
             </a:fld>
             <a:endParaRPr lang="en-US"/>
           </a:p>
@@ -1448,7 +1449,7 @@
             <a:fld id="{1D8BD707-D9CF-40AE-B4C6-C98DA3205C09}" type="datetimeFigureOut">
               <a:rPr lang="en-US" smtClean="0"/>
               <a:pPr/>
-              <a:t>12/22/2014</a:t>
+              <a:t>1/8/2015</a:t>
             </a:fld>
             <a:endParaRPr lang="en-US"/>
           </a:p>
@@ -1733,7 +1734,7 @@
             <a:fld id="{1D8BD707-D9CF-40AE-B4C6-C98DA3205C09}" type="datetimeFigureOut">
               <a:rPr lang="en-US" smtClean="0"/>
               <a:pPr/>
-              <a:t>12/22/2014</a:t>
+              <a:t>1/8/2015</a:t>
             </a:fld>
             <a:endParaRPr lang="en-US"/>
           </a:p>
@@ -2152,7 +2153,7 @@
             <a:fld id="{1D8BD707-D9CF-40AE-B4C6-C98DA3205C09}" type="datetimeFigureOut">
               <a:rPr lang="en-US" smtClean="0"/>
               <a:pPr/>
-              <a:t>12/22/2014</a:t>
+              <a:t>1/8/2015</a:t>
             </a:fld>
             <a:endParaRPr lang="en-US"/>
           </a:p>
@@ -2267,7 +2268,7 @@
             <a:fld id="{1D8BD707-D9CF-40AE-B4C6-C98DA3205C09}" type="datetimeFigureOut">
               <a:rPr lang="en-US" smtClean="0"/>
               <a:pPr/>
-              <a:t>12/22/2014</a:t>
+              <a:t>1/8/2015</a:t>
             </a:fld>
             <a:endParaRPr lang="en-US"/>
           </a:p>
@@ -2359,7 +2360,7 @@
             <a:fld id="{1D8BD707-D9CF-40AE-B4C6-C98DA3205C09}" type="datetimeFigureOut">
               <a:rPr lang="en-US" smtClean="0"/>
               <a:pPr/>
-              <a:t>12/22/2014</a:t>
+              <a:t>1/8/2015</a:t>
             </a:fld>
             <a:endParaRPr lang="en-US"/>
           </a:p>
@@ -2633,7 +2634,7 @@
             <a:fld id="{1D8BD707-D9CF-40AE-B4C6-C98DA3205C09}" type="datetimeFigureOut">
               <a:rPr lang="en-US" smtClean="0"/>
               <a:pPr/>
-              <a:t>12/22/2014</a:t>
+              <a:t>1/8/2015</a:t>
             </a:fld>
             <a:endParaRPr lang="en-US"/>
           </a:p>
@@ -2883,7 +2884,7 @@
             <a:fld id="{1D8BD707-D9CF-40AE-B4C6-C98DA3205C09}" type="datetimeFigureOut">
               <a:rPr lang="en-US" smtClean="0"/>
               <a:pPr/>
-              <a:t>12/22/2014</a:t>
+              <a:t>1/8/2015</a:t>
             </a:fld>
             <a:endParaRPr lang="en-US"/>
           </a:p>
@@ -3093,7 +3094,7 @@
             <a:fld id="{1D8BD707-D9CF-40AE-B4C6-C98DA3205C09}" type="datetimeFigureOut">
               <a:rPr lang="en-US" smtClean="0"/>
               <a:pPr/>
-              <a:t>12/22/2014</a:t>
+              <a:t>1/8/2015</a:t>
             </a:fld>
             <a:endParaRPr lang="en-US"/>
           </a:p>
@@ -4234,7 +4235,12 @@
             <p:ph idx="1"/>
           </p:nvPr>
         </p:nvSpPr>
-        <p:spPr/>
+        <p:spPr>
+          <a:xfrm>
+            <a:off x="457200" y="1600200"/>
+            <a:ext cx="8229600" cy="4724400"/>
+          </a:xfrm>
+        </p:spPr>
         <p:txBody>
           <a:bodyPr>
             <a:normAutofit fontScale="92500" lnSpcReduction="10000"/>
@@ -4354,7 +4360,11 @@
             </a:r>
             <a:r>
               <a:rPr lang="en-US"/>
-              <a:t>SSH keys: </a:t>
+              <a:t>SSH </a:t>
+            </a:r>
+            <a:r>
+              <a:rPr lang="en-US" smtClean="0"/>
+              <a:t>keys (optional): </a:t>
             </a:r>
             <a:r>
               <a:rPr lang="en-US" smtClean="0">
@@ -4374,8 +4384,24 @@
             <a:pPr lvl="1"/>
             <a:r>
               <a:rPr lang="en-US" smtClean="0"/>
-              <a:t>Not required, but more secure that HTTPS</a:t>
-            </a:r>
+              <a:t>More </a:t>
+            </a:r>
+            <a:r>
+              <a:rPr lang="en-US" smtClean="0"/>
+              <a:t>secure that </a:t>
+            </a:r>
+            <a:r>
+              <a:rPr lang="en-US" smtClean="0"/>
+              <a:t>HTTPS</a:t>
+            </a:r>
+          </a:p>
+          <a:p>
+            <a:pPr lvl="1"/>
+            <a:r>
+              <a:rPr lang="en-US" smtClean="0"/>
+              <a:t>Only necessary if HTTPS doesn’t work for you</a:t>
+            </a:r>
+            <a:endParaRPr lang="en-US" smtClean="0"/>
           </a:p>
         </p:txBody>
       </p:sp>
@@ -4433,7 +4459,7 @@
           <a:p>
             <a:r>
               <a:rPr lang="en-US" smtClean="0"/>
-              <a:t>Cloning a GitHub repo</a:t>
+              <a:t>Preview of what you’re about to do</a:t>
             </a:r>
             <a:endParaRPr lang="en-US"/>
           </a:p>
@@ -4452,99 +4478,31 @@
         <p:spPr/>
         <p:txBody>
           <a:bodyPr>
-            <a:normAutofit fontScale="92500" lnSpcReduction="10000"/>
+            <a:normAutofit/>
           </a:bodyPr>
           <a:lstStyle/>
           <a:p>
             <a:r>
               <a:rPr lang="en-US" smtClean="0"/>
-              <a:t>Cloning = copying to your local computer</a:t>
-            </a:r>
-          </a:p>
-          <a:p>
-            <a:pPr lvl="1"/>
-            <a:r>
-              <a:rPr lang="en-US" smtClean="0"/>
-              <a:t>Like copying your Dropbox files to a new machine</a:t>
-            </a:r>
-          </a:p>
-          <a:p>
-            <a:r>
-              <a:rPr lang="en-US" smtClean="0"/>
-              <a:t>First, change your working directory to where you want the repo to be stored: </a:t>
-            </a:r>
-            <a:r>
-              <a:rPr lang="en-US" smtClean="0">
-                <a:solidFill>
-                  <a:srgbClr val="C00000"/>
-                </a:solidFill>
-              </a:rPr>
-              <a:t>cd</a:t>
-            </a:r>
-          </a:p>
-          <a:p>
-            <a:r>
-              <a:rPr lang="en-US" smtClean="0"/>
-              <a:t>Then, clone the repo: </a:t>
-            </a:r>
-            <a:r>
-              <a:rPr lang="en-US" smtClean="0">
-                <a:solidFill>
-                  <a:srgbClr val="C00000"/>
-                </a:solidFill>
-              </a:rPr>
-              <a:t>git clone &lt;URL&gt;</a:t>
-            </a:r>
-          </a:p>
-          <a:p>
-            <a:pPr lvl="1"/>
-            <a:r>
-              <a:rPr lang="en-US" smtClean="0"/>
-              <a:t>Get HTTPS or SSH URL from GitHub (ends in .git)</a:t>
-            </a:r>
-          </a:p>
-          <a:p>
-            <a:pPr lvl="1"/>
-            <a:r>
-              <a:rPr lang="en-US" smtClean="0"/>
-              <a:t>Clones to a subdirectory of the working directory</a:t>
-            </a:r>
-          </a:p>
-          <a:p>
-            <a:pPr lvl="1"/>
-            <a:r>
-              <a:rPr lang="en-US" smtClean="0"/>
-              <a:t>No visual feedback when you type your password</a:t>
-            </a:r>
-          </a:p>
-          <a:p>
-            <a:r>
-              <a:rPr lang="en-US" smtClean="0"/>
-              <a:t>Navigate to the repo (</a:t>
-            </a:r>
-            <a:r>
-              <a:rPr lang="en-US" smtClean="0">
-                <a:solidFill>
-                  <a:srgbClr val="C00000"/>
-                </a:solidFill>
-              </a:rPr>
-              <a:t>cd</a:t>
-            </a:r>
-            <a:r>
-              <a:rPr lang="en-US" smtClean="0"/>
-              <a:t>) then list the files (</a:t>
-            </a:r>
-            <a:r>
-              <a:rPr lang="en-US" smtClean="0">
-                <a:solidFill>
-                  <a:srgbClr val="C00000"/>
-                </a:solidFill>
-              </a:rPr>
-              <a:t>ls</a:t>
-            </a:r>
-            <a:r>
-              <a:rPr lang="en-US" smtClean="0"/>
-              <a:t>)</a:t>
+              <a:t>Copy your new GitHub repo to your computer</a:t>
+            </a:r>
+          </a:p>
+          <a:p>
+            <a:r>
+              <a:rPr lang="en-US" smtClean="0"/>
+              <a:t>Make some file changes locally</a:t>
+            </a:r>
+          </a:p>
+          <a:p>
+            <a:r>
+              <a:rPr lang="en-US" smtClean="0"/>
+              <a:t>Save those changes locally (“commit” them)</a:t>
+            </a:r>
+          </a:p>
+          <a:p>
+            <a:r>
+              <a:rPr lang="en-US" smtClean="0"/>
+              <a:t>Update your GitHub repo with those changes</a:t>
             </a:r>
           </a:p>
         </p:txBody>
@@ -4552,7 +4510,7 @@
     </p:spTree>
     <p:extLst>
       <p:ext uri="{BB962C8B-B14F-4D97-AF65-F5344CB8AC3E}">
-        <p14:creationId xmlns:p14="http://schemas.microsoft.com/office/powerpoint/2010/main" val="1504453294"/>
+        <p14:creationId xmlns:p14="http://schemas.microsoft.com/office/powerpoint/2010/main" val="2988114977"/>
       </p:ext>
     </p:extLst>
   </p:cSld>
@@ -4603,7 +4561,7 @@
           <a:p>
             <a:r>
               <a:rPr lang="en-US" smtClean="0"/>
-              <a:t>Checking your remotes</a:t>
+              <a:t>Cloning a GitHub repo</a:t>
             </a:r>
             <a:endParaRPr lang="en-US"/>
           </a:p>
@@ -4621,39 +4579,35 @@
         </p:nvSpPr>
         <p:spPr/>
         <p:txBody>
-          <a:bodyPr/>
-          <a:lstStyle/>
-          <a:p>
-            <a:r>
-              <a:rPr lang="en-US" smtClean="0"/>
-              <a:t>A “remote alias” is a reference to a repo not on your local computer</a:t>
+          <a:bodyPr>
+            <a:normAutofit fontScale="92500" lnSpcReduction="10000"/>
+          </a:bodyPr>
+          <a:lstStyle/>
+          <a:p>
+            <a:r>
+              <a:rPr lang="en-US" smtClean="0"/>
+              <a:t>Cloning = copying to your local computer</a:t>
             </a:r>
           </a:p>
           <a:p>
             <a:pPr lvl="1"/>
             <a:r>
               <a:rPr lang="en-US" smtClean="0"/>
-              <a:t>Like a connection to your Dropbox account</a:t>
-            </a:r>
-          </a:p>
-          <a:p>
-            <a:r>
-              <a:rPr lang="en-US" smtClean="0"/>
-              <a:t>“origin” remote was set up by “git clone”</a:t>
-            </a:r>
-          </a:p>
-          <a:p>
-            <a:r>
-              <a:rPr lang="en-US"/>
-              <a:t>View remotes: </a:t>
-            </a:r>
-            <a:r>
-              <a:rPr lang="en-US">
-                <a:solidFill>
-                  <a:srgbClr val="C00000"/>
-                </a:solidFill>
-              </a:rPr>
-              <a:t>git remote -</a:t>
+              <a:t>Like copying your Dropbox files to a new machine</a:t>
+            </a:r>
+          </a:p>
+          <a:p>
+            <a:r>
+              <a:rPr lang="en-US" smtClean="0"/>
+              <a:t>First, change your working directory to where you want the repo </a:t>
+            </a:r>
+            <a:r>
+              <a:rPr lang="en-US" smtClean="0"/>
+              <a:t>you created to </a:t>
+            </a:r>
+            <a:r>
+              <a:rPr lang="en-US" smtClean="0"/>
+              <a:t>be stored: </a:t>
             </a:r>
             <a:r>
               <a:rPr lang="en-US" smtClean="0">
@@ -4661,14 +4615,72 @@
                   <a:srgbClr val="C00000"/>
                 </a:solidFill>
               </a:rPr>
-              <a:t>v</a:t>
-            </a:r>
-            <a:endParaRPr lang="en-US" smtClean="0"/>
-          </a:p>
-          <a:p>
-            <a:r>
-              <a:rPr lang="en-US" smtClean="0"/>
-              <a:t>Note: Remotes are repo-specific</a:t>
+              <a:t>cd</a:t>
+            </a:r>
+          </a:p>
+          <a:p>
+            <a:r>
+              <a:rPr lang="en-US" smtClean="0"/>
+              <a:t>Then, clone the repo: </a:t>
+            </a:r>
+            <a:r>
+              <a:rPr lang="en-US" smtClean="0">
+                <a:solidFill>
+                  <a:srgbClr val="C00000"/>
+                </a:solidFill>
+              </a:rPr>
+              <a:t>git clone &lt;URL&gt;</a:t>
+            </a:r>
+          </a:p>
+          <a:p>
+            <a:pPr lvl="1"/>
+            <a:r>
+              <a:rPr lang="en-US" smtClean="0"/>
+              <a:t>Get HTTPS or SSH URL from GitHub (ends in .git)</a:t>
+            </a:r>
+          </a:p>
+          <a:p>
+            <a:pPr lvl="1"/>
+            <a:r>
+              <a:rPr lang="en-US" smtClean="0"/>
+              <a:t>Clones to a subdirectory of the working directory</a:t>
+            </a:r>
+          </a:p>
+          <a:p>
+            <a:pPr lvl="1"/>
+            <a:r>
+              <a:rPr lang="en-US" smtClean="0"/>
+              <a:t>No visual feedback when you type your password</a:t>
+            </a:r>
+          </a:p>
+          <a:p>
+            <a:r>
+              <a:rPr lang="en-US" smtClean="0"/>
+              <a:t>Navigate to the repo (</a:t>
+            </a:r>
+            <a:r>
+              <a:rPr lang="en-US" smtClean="0">
+                <a:solidFill>
+                  <a:srgbClr val="C00000"/>
+                </a:solidFill>
+              </a:rPr>
+              <a:t>cd</a:t>
+            </a:r>
+            <a:r>
+              <a:rPr lang="en-US" smtClean="0"/>
+              <a:t>) then list the files (</a:t>
+            </a:r>
+            <a:r>
+              <a:rPr lang="en-US" smtClean="0">
+                <a:solidFill>
+                  <a:srgbClr val="C00000"/>
+                </a:solidFill>
+              </a:rPr>
+              <a:t>ls</a:t>
+            </a:r>
+            <a:r>
+              <a:rPr lang="en-US" smtClean="0"/>
+              <a:t>)</a:t>
             </a:r>
           </a:p>
         </p:txBody>
@@ -4676,7 +4688,7 @@
     </p:spTree>
     <p:extLst>
       <p:ext uri="{BB962C8B-B14F-4D97-AF65-F5344CB8AC3E}">
-        <p14:creationId xmlns:p14="http://schemas.microsoft.com/office/powerpoint/2010/main" val="3828473833"/>
+        <p14:creationId xmlns:p14="http://schemas.microsoft.com/office/powerpoint/2010/main" val="1504453294"/>
       </p:ext>
     </p:extLst>
   </p:cSld>
@@ -4722,14 +4734,12 @@
         </p:nvSpPr>
         <p:spPr/>
         <p:txBody>
-          <a:bodyPr>
-            <a:normAutofit fontScale="90000"/>
-          </a:bodyPr>
-          <a:lstStyle/>
-          <a:p>
-            <a:r>
-              <a:rPr lang="en-US" smtClean="0"/>
-              <a:t>Making changes, checking your status</a:t>
+          <a:bodyPr/>
+          <a:lstStyle/>
+          <a:p>
+            <a:r>
+              <a:rPr lang="en-US" smtClean="0"/>
+              <a:t>Checking your remotes</a:t>
             </a:r>
             <a:endParaRPr lang="en-US"/>
           </a:p>
@@ -4747,28 +4757,37 @@
         </p:nvSpPr>
         <p:spPr/>
         <p:txBody>
-          <a:bodyPr>
-            <a:normAutofit fontScale="92500" lnSpcReduction="20000"/>
-          </a:bodyPr>
-          <a:lstStyle/>
-          <a:p>
-            <a:r>
-              <a:rPr lang="en-US" smtClean="0"/>
-              <a:t>Making changes:</a:t>
+          <a:bodyPr/>
+          <a:lstStyle/>
+          <a:p>
+            <a:r>
+              <a:rPr lang="en-US" smtClean="0"/>
+              <a:t>A “remote alias” is a reference to a repo not on your local computer</a:t>
             </a:r>
           </a:p>
           <a:p>
             <a:pPr lvl="1"/>
             <a:r>
               <a:rPr lang="en-US" smtClean="0"/>
-              <a:t>Modify README.md in any text editor</a:t>
-            </a:r>
-          </a:p>
-          <a:p>
-            <a:pPr lvl="1"/>
-            <a:r>
-              <a:rPr lang="en-US" smtClean="0"/>
-              <a:t>Create a new file: </a:t>
+              <a:t>Like a connection to your Dropbox account</a:t>
+            </a:r>
+          </a:p>
+          <a:p>
+            <a:r>
+              <a:rPr lang="en-US" smtClean="0"/>
+              <a:t>View </a:t>
+            </a:r>
+            <a:r>
+              <a:rPr lang="en-US"/>
+              <a:t>remotes: </a:t>
+            </a:r>
+            <a:r>
+              <a:rPr lang="en-US">
+                <a:solidFill>
+                  <a:srgbClr val="C00000"/>
+                </a:solidFill>
+              </a:rPr>
+              <a:t>git remote -</a:t>
             </a:r>
             <a:r>
               <a:rPr lang="en-US" smtClean="0">
@@ -4776,66 +4795,24 @@
                   <a:srgbClr val="C00000"/>
                 </a:solidFill>
               </a:rPr>
-              <a:t>touch &lt;filename&gt;</a:t>
-            </a:r>
-          </a:p>
-          <a:p>
-            <a:r>
-              <a:rPr lang="en-US" smtClean="0"/>
-              <a:t>Check your status:</a:t>
-            </a:r>
-          </a:p>
-          <a:p>
-            <a:pPr lvl="1"/>
-            <a:r>
-              <a:rPr lang="en-US" smtClean="0"/>
-              <a:t> </a:t>
-            </a:r>
-            <a:r>
-              <a:rPr lang="en-US" smtClean="0">
-                <a:solidFill>
-                  <a:srgbClr val="C00000"/>
-                </a:solidFill>
-              </a:rPr>
-              <a:t>git status</a:t>
-            </a:r>
-          </a:p>
-          <a:p>
-            <a:r>
-              <a:rPr lang="en-US" smtClean="0"/>
-              <a:t>File statuses (possibly color-coded):</a:t>
-            </a:r>
-          </a:p>
-          <a:p>
-            <a:pPr lvl="1"/>
-            <a:r>
-              <a:rPr lang="en-US" smtClean="0"/>
-              <a:t>Untracked (red)</a:t>
-            </a:r>
-          </a:p>
-          <a:p>
-            <a:pPr lvl="1"/>
-            <a:r>
-              <a:rPr lang="en-US" smtClean="0"/>
-              <a:t>Tracked and modified (red)</a:t>
-            </a:r>
-          </a:p>
-          <a:p>
-            <a:pPr lvl="1"/>
+              <a:t>v</a:t>
+            </a:r>
+            <a:endParaRPr lang="en-US" smtClean="0"/>
+          </a:p>
+          <a:p>
             <a:r>
               <a:rPr lang="en-US"/>
-              <a:t>S</a:t>
-            </a:r>
-            <a:r>
-              <a:rPr lang="en-US" smtClean="0"/>
-              <a:t>taged for committing (green)</a:t>
-            </a:r>
-          </a:p>
-          <a:p>
-            <a:pPr lvl="1"/>
-            <a:r>
-              <a:rPr lang="en-US" smtClean="0"/>
-              <a:t>Committed</a:t>
+              <a:t>“origin” remote was set up by “git clone”</a:t>
+            </a:r>
+          </a:p>
+          <a:p>
+            <a:r>
+              <a:rPr lang="en-US" smtClean="0"/>
+              <a:t>Note</a:t>
+            </a:r>
+            <a:r>
+              <a:rPr lang="en-US" smtClean="0"/>
+              <a:t>: Remotes are repo-specific</a:t>
             </a:r>
           </a:p>
         </p:txBody>
@@ -4843,7 +4820,7 @@
     </p:spTree>
     <p:extLst>
       <p:ext uri="{BB962C8B-B14F-4D97-AF65-F5344CB8AC3E}">
-        <p14:creationId xmlns:p14="http://schemas.microsoft.com/office/powerpoint/2010/main" val="3431436500"/>
+        <p14:creationId xmlns:p14="http://schemas.microsoft.com/office/powerpoint/2010/main" val="3828473833"/>
       </p:ext>
     </p:extLst>
   </p:cSld>
@@ -4889,16 +4866,14 @@
         </p:nvSpPr>
         <p:spPr/>
         <p:txBody>
-          <a:bodyPr/>
-          <a:lstStyle/>
-          <a:p>
-            <a:r>
-              <a:rPr lang="en-US"/>
-              <a:t>Committing </a:t>
-            </a:r>
-            <a:r>
-              <a:rPr lang="en-US" smtClean="0"/>
-              <a:t>changes</a:t>
+          <a:bodyPr>
+            <a:normAutofit fontScale="90000"/>
+          </a:bodyPr>
+          <a:lstStyle/>
+          <a:p>
+            <a:r>
+              <a:rPr lang="en-US" smtClean="0"/>
+              <a:t>Making changes, checking your status</a:t>
             </a:r>
             <a:endParaRPr lang="en-US"/>
           </a:p>
@@ -4917,20 +4892,27 @@
         <p:spPr/>
         <p:txBody>
           <a:bodyPr>
-            <a:normAutofit fontScale="92500" lnSpcReduction="10000"/>
+            <a:normAutofit fontScale="92500" lnSpcReduction="20000"/>
           </a:bodyPr>
           <a:lstStyle/>
           <a:p>
             <a:r>
               <a:rPr lang="en-US" smtClean="0"/>
-              <a:t>Stage changes for committing:</a:t>
+              <a:t>Making changes:</a:t>
             </a:r>
           </a:p>
           <a:p>
             <a:pPr lvl="1"/>
             <a:r>
               <a:rPr lang="en-US" smtClean="0"/>
-              <a:t>Add a single file: </a:t>
+              <a:t>Modify README.md in any text editor</a:t>
+            </a:r>
+          </a:p>
+          <a:p>
+            <a:pPr lvl="1"/>
+            <a:r>
+              <a:rPr lang="en-US" smtClean="0"/>
+              <a:t>Create a new file: </a:t>
             </a:r>
             <a:r>
               <a:rPr lang="en-US" smtClean="0">
@@ -4938,14 +4920,20 @@
                   <a:srgbClr val="C00000"/>
                 </a:solidFill>
               </a:rPr>
-              <a:t>git add &lt;filename&gt;</a:t>
+              <a:t>touch &lt;filename&gt;</a:t>
+            </a:r>
+          </a:p>
+          <a:p>
+            <a:r>
+              <a:rPr lang="en-US" smtClean="0"/>
+              <a:t>Check your status:</a:t>
             </a:r>
           </a:p>
           <a:p>
             <a:pPr lvl="1"/>
             <a:r>
               <a:rPr lang="en-US" smtClean="0"/>
-              <a:t>Add all “red” files: </a:t>
+              <a:t> </a:t>
             </a:r>
             <a:r>
               <a:rPr lang="en-US" smtClean="0">
@@ -4953,74 +4941,53 @@
                   <a:srgbClr val="C00000"/>
                 </a:solidFill>
               </a:rPr>
-              <a:t>git add .</a:t>
-            </a:r>
-          </a:p>
-          <a:p>
-            <a:r>
-              <a:rPr lang="en-US" smtClean="0"/>
-              <a:t>Check your status:</a:t>
+              <a:t>git status</a:t>
+            </a:r>
+          </a:p>
+          <a:p>
+            <a:r>
+              <a:rPr lang="en-US" smtClean="0"/>
+              <a:t>File statuses (possibly color-coded):</a:t>
             </a:r>
           </a:p>
           <a:p>
             <a:pPr lvl="1"/>
             <a:r>
               <a:rPr lang="en-US" smtClean="0"/>
-              <a:t>Red files have turned green</a:t>
-            </a:r>
-          </a:p>
-          <a:p>
-            <a:r>
-              <a:rPr lang="en-US" smtClean="0"/>
-              <a:t>Commit changes:</a:t>
+              <a:t>Untracked (red)</a:t>
             </a:r>
           </a:p>
           <a:p>
             <a:pPr lvl="1"/>
             <a:r>
               <a:rPr lang="en-US" smtClean="0"/>
-              <a:t> </a:t>
-            </a:r>
-            <a:r>
-              <a:rPr lang="en-US" smtClean="0">
-                <a:solidFill>
-                  <a:srgbClr val="C00000"/>
-                </a:solidFill>
-              </a:rPr>
-              <a:t>git commit -m “message about commit”</a:t>
-            </a:r>
-          </a:p>
-          <a:p>
-            <a:r>
-              <a:rPr lang="en-US" smtClean="0"/>
-              <a:t>Check your status again!</a:t>
-            </a:r>
-          </a:p>
-          <a:p>
-            <a:r>
-              <a:rPr lang="en-US" smtClean="0"/>
-              <a:t>Check the log: </a:t>
-            </a:r>
-            <a:r>
-              <a:rPr lang="en-US" smtClean="0">
-                <a:solidFill>
-                  <a:srgbClr val="C00000"/>
-                </a:solidFill>
-              </a:rPr>
-              <a:t>git log</a:t>
-            </a:r>
-            <a:endParaRPr lang="en-US">
-              <a:solidFill>
-                <a:srgbClr val="C00000"/>
-              </a:solidFill>
-            </a:endParaRPr>
+              <a:t>Tracked and modified (red)</a:t>
+            </a:r>
+          </a:p>
+          <a:p>
+            <a:pPr lvl="1"/>
+            <a:r>
+              <a:rPr lang="en-US"/>
+              <a:t>S</a:t>
+            </a:r>
+            <a:r>
+              <a:rPr lang="en-US" smtClean="0"/>
+              <a:t>taged for committing (green)</a:t>
+            </a:r>
+          </a:p>
+          <a:p>
+            <a:pPr lvl="1"/>
+            <a:r>
+              <a:rPr lang="en-US" smtClean="0"/>
+              <a:t>Committed</a:t>
+            </a:r>
           </a:p>
         </p:txBody>
       </p:sp>
     </p:spTree>
     <p:extLst>
       <p:ext uri="{BB962C8B-B14F-4D97-AF65-F5344CB8AC3E}">
-        <p14:creationId xmlns:p14="http://schemas.microsoft.com/office/powerpoint/2010/main" val="3199936325"/>
+        <p14:creationId xmlns:p14="http://schemas.microsoft.com/office/powerpoint/2010/main" val="3431436500"/>
       </p:ext>
     </p:extLst>
   </p:cSld>
@@ -5197,8 +5164,12 @@
           <a:lstStyle/>
           <a:p>
             <a:r>
-              <a:rPr lang="en-US" smtClean="0"/>
-              <a:t>Pushing to GitHub</a:t>
+              <a:rPr lang="en-US"/>
+              <a:t>Committing </a:t>
+            </a:r>
+            <a:r>
+              <a:rPr lang="en-US" smtClean="0"/>
+              <a:t>changes</a:t>
             </a:r>
             <a:endParaRPr lang="en-US"/>
           </a:p>
@@ -5217,39 +5188,20 @@
         <p:spPr/>
         <p:txBody>
           <a:bodyPr>
-            <a:normAutofit/>
+            <a:normAutofit fontScale="92500" lnSpcReduction="10000"/>
           </a:bodyPr>
           <a:lstStyle/>
           <a:p>
             <a:r>
               <a:rPr lang="en-US" smtClean="0"/>
-              <a:t>Everything you’ve done to your cloned repo (so far) has been local</a:t>
-            </a:r>
-          </a:p>
-          <a:p>
-            <a:r>
-              <a:rPr lang="en-US" smtClean="0"/>
-              <a:t>You’ve been working in the “master” branch</a:t>
-            </a:r>
-          </a:p>
-          <a:p>
-            <a:r>
-              <a:rPr lang="en-US" smtClean="0"/>
-              <a:t>Push committed changes to GitHub:</a:t>
+              <a:t>Stage changes for committing:</a:t>
             </a:r>
           </a:p>
           <a:p>
             <a:pPr lvl="1"/>
             <a:r>
               <a:rPr lang="en-US" smtClean="0"/>
-              <a:t>Like syncing local file changes to Dropbox</a:t>
-            </a:r>
-          </a:p>
-          <a:p>
-            <a:pPr lvl="1"/>
-            <a:r>
-              <a:rPr lang="en-US" smtClean="0"/>
-              <a:t> </a:t>
+              <a:t>Add a single file: </a:t>
             </a:r>
             <a:r>
               <a:rPr lang="en-US" smtClean="0">
@@ -5257,14 +5209,14 @@
                   <a:srgbClr val="C00000"/>
                 </a:solidFill>
               </a:rPr>
-              <a:t>git push &lt;remote&gt; &lt;branch&gt;</a:t>
+              <a:t>git add &lt;filename&gt;</a:t>
             </a:r>
           </a:p>
           <a:p>
             <a:pPr lvl="1"/>
             <a:r>
               <a:rPr lang="en-US" smtClean="0"/>
-              <a:t>Often: </a:t>
+              <a:t>Add all “red” files: </a:t>
             </a:r>
             <a:r>
               <a:rPr lang="en-US" smtClean="0">
@@ -5272,22 +5224,74 @@
                   <a:srgbClr val="C00000"/>
                 </a:solidFill>
               </a:rPr>
-              <a:t>git push origin master</a:t>
-            </a:r>
-          </a:p>
-          <a:p>
-            <a:r>
-              <a:rPr lang="en-US" smtClean="0"/>
-              <a:t>Refresh your GitHub repo to check!</a:t>
-            </a:r>
-            <a:endParaRPr lang="en-US"/>
+              <a:t>git add .</a:t>
+            </a:r>
+          </a:p>
+          <a:p>
+            <a:r>
+              <a:rPr lang="en-US" smtClean="0"/>
+              <a:t>Check your status:</a:t>
+            </a:r>
+          </a:p>
+          <a:p>
+            <a:pPr lvl="1"/>
+            <a:r>
+              <a:rPr lang="en-US" smtClean="0"/>
+              <a:t>Red files have turned green</a:t>
+            </a:r>
+          </a:p>
+          <a:p>
+            <a:r>
+              <a:rPr lang="en-US" smtClean="0"/>
+              <a:t>Commit changes:</a:t>
+            </a:r>
+          </a:p>
+          <a:p>
+            <a:pPr lvl="1"/>
+            <a:r>
+              <a:rPr lang="en-US" smtClean="0"/>
+              <a:t> </a:t>
+            </a:r>
+            <a:r>
+              <a:rPr lang="en-US" smtClean="0">
+                <a:solidFill>
+                  <a:srgbClr val="C00000"/>
+                </a:solidFill>
+              </a:rPr>
+              <a:t>git commit -m “message about commit”</a:t>
+            </a:r>
+          </a:p>
+          <a:p>
+            <a:r>
+              <a:rPr lang="en-US" smtClean="0"/>
+              <a:t>Check your status again!</a:t>
+            </a:r>
+          </a:p>
+          <a:p>
+            <a:r>
+              <a:rPr lang="en-US" smtClean="0"/>
+              <a:t>Check the log: </a:t>
+            </a:r>
+            <a:r>
+              <a:rPr lang="en-US" smtClean="0">
+                <a:solidFill>
+                  <a:srgbClr val="C00000"/>
+                </a:solidFill>
+              </a:rPr>
+              <a:t>git log</a:t>
+            </a:r>
+            <a:endParaRPr lang="en-US">
+              <a:solidFill>
+                <a:srgbClr val="C00000"/>
+              </a:solidFill>
+            </a:endParaRPr>
           </a:p>
         </p:txBody>
       </p:sp>
     </p:spTree>
     <p:extLst>
       <p:ext uri="{BB962C8B-B14F-4D97-AF65-F5344CB8AC3E}">
-        <p14:creationId xmlns:p14="http://schemas.microsoft.com/office/powerpoint/2010/main" val="963782855"/>
+        <p14:creationId xmlns:p14="http://schemas.microsoft.com/office/powerpoint/2010/main" val="3199936325"/>
       </p:ext>
     </p:extLst>
   </p:cSld>
@@ -5338,7 +5342,7 @@
           <a:p>
             <a:r>
               <a:rPr lang="en-US" smtClean="0"/>
-              <a:t>Quick recap of what you’ve done</a:t>
+              <a:t>Pushing to GitHub</a:t>
             </a:r>
             <a:endParaRPr lang="en-US"/>
           </a:p>
@@ -5357,19 +5361,39 @@
         <p:spPr/>
         <p:txBody>
           <a:bodyPr>
-            <a:normAutofit fontScale="92500" lnSpcReduction="10000"/>
+            <a:normAutofit/>
           </a:bodyPr>
           <a:lstStyle/>
           <a:p>
             <a:r>
               <a:rPr lang="en-US" smtClean="0"/>
-              <a:t>Created a repo on GitHub</a:t>
-            </a:r>
-          </a:p>
-          <a:p>
-            <a:r>
-              <a:rPr lang="en-US" smtClean="0"/>
-              <a:t>Cloned repo to your local computer (</a:t>
+              <a:t>Everything you’ve done to your cloned repo (so far) has been local</a:t>
+            </a:r>
+          </a:p>
+          <a:p>
+            <a:r>
+              <a:rPr lang="en-US" smtClean="0"/>
+              <a:t>You’ve been working in the “master” branch</a:t>
+            </a:r>
+          </a:p>
+          <a:p>
+            <a:r>
+              <a:rPr lang="en-US" smtClean="0"/>
+              <a:t>Push committed changes to GitHub:</a:t>
+            </a:r>
+          </a:p>
+          <a:p>
+            <a:pPr lvl="1"/>
+            <a:r>
+              <a:rPr lang="en-US" smtClean="0"/>
+              <a:t>Like syncing local file changes to Dropbox</a:t>
+            </a:r>
+          </a:p>
+          <a:p>
+            <a:pPr lvl="1"/>
+            <a:r>
+              <a:rPr lang="en-US" smtClean="0"/>
+              <a:t> </a:t>
             </a:r>
             <a:r>
               <a:rPr lang="en-US" smtClean="0">
@@ -5377,30 +5401,14 @@
                   <a:srgbClr val="C00000"/>
                 </a:solidFill>
               </a:rPr>
-              <a:t>git clone</a:t>
-            </a:r>
-            <a:r>
-              <a:rPr lang="en-US" smtClean="0"/>
-              <a:t>)</a:t>
+              <a:t>git push &lt;remote&gt; &lt;branch&gt;</a:t>
             </a:r>
           </a:p>
           <a:p>
             <a:pPr lvl="1"/>
             <a:r>
               <a:rPr lang="en-US" smtClean="0"/>
-              <a:t>Automatically sets up your “origin” remote</a:t>
-            </a:r>
-          </a:p>
-          <a:p>
-            <a:r>
-              <a:rPr lang="en-US" smtClean="0"/>
-              <a:t>Made two file changes</a:t>
-            </a:r>
-          </a:p>
-          <a:p>
-            <a:r>
-              <a:rPr lang="en-US" smtClean="0"/>
-              <a:t>Staged changes for committing (</a:t>
+              <a:t>Often: </a:t>
             </a:r>
             <a:r>
               <a:rPr lang="en-US" smtClean="0">
@@ -5408,89 +5416,13 @@
                   <a:srgbClr val="C00000"/>
                 </a:solidFill>
               </a:rPr>
-              <a:t>git add</a:t>
-            </a:r>
-            <a:r>
-              <a:rPr lang="en-US" smtClean="0"/>
-              <a:t>)</a:t>
-            </a:r>
-          </a:p>
-          <a:p>
-            <a:r>
-              <a:rPr lang="en-US" smtClean="0"/>
-              <a:t>Committed changes (</a:t>
-            </a:r>
-            <a:r>
-              <a:rPr lang="en-US" smtClean="0">
-                <a:solidFill>
-                  <a:srgbClr val="C00000"/>
-                </a:solidFill>
-              </a:rPr>
-              <a:t>git commit</a:t>
-            </a:r>
-            <a:r>
-              <a:rPr lang="en-US" smtClean="0"/>
-              <a:t>)</a:t>
-            </a:r>
-          </a:p>
-          <a:p>
-            <a:r>
-              <a:rPr lang="en-US" smtClean="0"/>
-              <a:t>Pushed changes to GitHub (</a:t>
-            </a:r>
-            <a:r>
-              <a:rPr lang="en-US" smtClean="0">
-                <a:solidFill>
-                  <a:srgbClr val="C00000"/>
-                </a:solidFill>
-              </a:rPr>
-              <a:t>git push</a:t>
-            </a:r>
-            <a:r>
-              <a:rPr lang="en-US" smtClean="0"/>
-              <a:t>)</a:t>
-            </a:r>
-          </a:p>
-          <a:p>
-            <a:r>
-              <a:rPr lang="en-US" smtClean="0"/>
-              <a:t>Inspected along the way (</a:t>
-            </a:r>
-            <a:r>
-              <a:rPr lang="en-US" smtClean="0">
-                <a:solidFill>
-                  <a:srgbClr val="C00000"/>
-                </a:solidFill>
-              </a:rPr>
-              <a:t>git remote</a:t>
-            </a:r>
-            <a:r>
-              <a:rPr lang="en-US" smtClean="0"/>
-              <a:t>, </a:t>
-            </a:r>
-            <a:r>
-              <a:rPr lang="en-US" smtClean="0">
-                <a:solidFill>
-                  <a:srgbClr val="C00000"/>
-                </a:solidFill>
-              </a:rPr>
-              <a:t>git status</a:t>
-            </a:r>
-            <a:r>
-              <a:rPr lang="en-US" smtClean="0"/>
-              <a:t>, </a:t>
-            </a:r>
-            <a:r>
-              <a:rPr lang="en-US" smtClean="0">
-                <a:solidFill>
-                  <a:srgbClr val="C00000"/>
-                </a:solidFill>
-              </a:rPr>
-              <a:t>git log</a:t>
-            </a:r>
-            <a:r>
-              <a:rPr lang="en-US" smtClean="0"/>
-              <a:t>)</a:t>
+              <a:t>git push origin master</a:t>
+            </a:r>
+          </a:p>
+          <a:p>
+            <a:r>
+              <a:rPr lang="en-US" smtClean="0"/>
+              <a:t>Refresh your GitHub repo to check!</a:t>
             </a:r>
             <a:endParaRPr lang="en-US"/>
           </a:p>
@@ -5499,7 +5431,7 @@
     </p:spTree>
     <p:extLst>
       <p:ext uri="{BB962C8B-B14F-4D97-AF65-F5344CB8AC3E}">
-        <p14:creationId xmlns:p14="http://schemas.microsoft.com/office/powerpoint/2010/main" val="3631315944"/>
+        <p14:creationId xmlns:p14="http://schemas.microsoft.com/office/powerpoint/2010/main" val="963782855"/>
       </p:ext>
     </p:extLst>
   </p:cSld>
@@ -5550,7 +5482,7 @@
           <a:p>
             <a:r>
               <a:rPr lang="en-US" smtClean="0"/>
-              <a:t>Let’s do it again!</a:t>
+              <a:t>Quick recap of what you’ve done</a:t>
             </a:r>
             <a:endParaRPr lang="en-US"/>
           </a:p>
@@ -5568,12 +5500,117 @@
         </p:nvSpPr>
         <p:spPr/>
         <p:txBody>
-          <a:bodyPr/>
-          <a:lstStyle/>
-          <a:p>
-            <a:r>
-              <a:rPr lang="en-US" smtClean="0"/>
-              <a:t>Modify or add a file, then </a:t>
+          <a:bodyPr>
+            <a:normAutofit fontScale="92500" lnSpcReduction="10000"/>
+          </a:bodyPr>
+          <a:lstStyle/>
+          <a:p>
+            <a:r>
+              <a:rPr lang="en-US" smtClean="0"/>
+              <a:t>Created a repo on GitHub</a:t>
+            </a:r>
+          </a:p>
+          <a:p>
+            <a:r>
+              <a:rPr lang="en-US" smtClean="0"/>
+              <a:t>Cloned repo to your local computer (</a:t>
+            </a:r>
+            <a:r>
+              <a:rPr lang="en-US" smtClean="0">
+                <a:solidFill>
+                  <a:srgbClr val="C00000"/>
+                </a:solidFill>
+              </a:rPr>
+              <a:t>git clone</a:t>
+            </a:r>
+            <a:r>
+              <a:rPr lang="en-US" smtClean="0"/>
+              <a:t>)</a:t>
+            </a:r>
+          </a:p>
+          <a:p>
+            <a:pPr lvl="1"/>
+            <a:r>
+              <a:rPr lang="en-US" smtClean="0"/>
+              <a:t>Automatically sets up your “origin” remote</a:t>
+            </a:r>
+          </a:p>
+          <a:p>
+            <a:r>
+              <a:rPr lang="en-US" smtClean="0"/>
+              <a:t>Made two file changes</a:t>
+            </a:r>
+          </a:p>
+          <a:p>
+            <a:r>
+              <a:rPr lang="en-US" smtClean="0"/>
+              <a:t>Staged changes for committing (</a:t>
+            </a:r>
+            <a:r>
+              <a:rPr lang="en-US" smtClean="0">
+                <a:solidFill>
+                  <a:srgbClr val="C00000"/>
+                </a:solidFill>
+              </a:rPr>
+              <a:t>git add</a:t>
+            </a:r>
+            <a:r>
+              <a:rPr lang="en-US" smtClean="0"/>
+              <a:t>)</a:t>
+            </a:r>
+          </a:p>
+          <a:p>
+            <a:r>
+              <a:rPr lang="en-US" smtClean="0"/>
+              <a:t>Committed changes (</a:t>
+            </a:r>
+            <a:r>
+              <a:rPr lang="en-US" smtClean="0">
+                <a:solidFill>
+                  <a:srgbClr val="C00000"/>
+                </a:solidFill>
+              </a:rPr>
+              <a:t>git commit</a:t>
+            </a:r>
+            <a:r>
+              <a:rPr lang="en-US" smtClean="0"/>
+              <a:t>)</a:t>
+            </a:r>
+          </a:p>
+          <a:p>
+            <a:r>
+              <a:rPr lang="en-US" smtClean="0"/>
+              <a:t>Pushed changes to GitHub (</a:t>
+            </a:r>
+            <a:r>
+              <a:rPr lang="en-US" smtClean="0">
+                <a:solidFill>
+                  <a:srgbClr val="C00000"/>
+                </a:solidFill>
+              </a:rPr>
+              <a:t>git push</a:t>
+            </a:r>
+            <a:r>
+              <a:rPr lang="en-US" smtClean="0"/>
+              <a:t>)</a:t>
+            </a:r>
+          </a:p>
+          <a:p>
+            <a:r>
+              <a:rPr lang="en-US" smtClean="0"/>
+              <a:t>Inspected along the way (</a:t>
+            </a:r>
+            <a:r>
+              <a:rPr lang="en-US" smtClean="0">
+                <a:solidFill>
+                  <a:srgbClr val="C00000"/>
+                </a:solidFill>
+              </a:rPr>
+              <a:t>git remote</a:t>
+            </a:r>
+            <a:r>
+              <a:rPr lang="en-US" smtClean="0"/>
+              <a:t>, </a:t>
             </a:r>
             <a:r>
               <a:rPr lang="en-US" smtClean="0">
@@ -5583,11 +5620,9 @@
               </a:rPr>
               <a:t>git status</a:t>
             </a:r>
-          </a:p>
-          <a:p>
-            <a:r>
-              <a:rPr lang="en-US" smtClean="0"/>
-              <a:t> </a:t>
+            <a:r>
+              <a:rPr lang="en-US" smtClean="0"/>
+              <a:t>, </a:t>
             </a:r>
             <a:r>
               <a:rPr lang="en-US" smtClean="0">
@@ -5595,56 +5630,12 @@
                   <a:srgbClr val="C00000"/>
                 </a:solidFill>
               </a:rPr>
-              <a:t>git add .</a:t>
-            </a:r>
-            <a:r>
-              <a:rPr lang="en-US" smtClean="0"/>
-              <a:t>, then </a:t>
-            </a:r>
-            <a:r>
-              <a:rPr lang="en-US" smtClean="0">
-                <a:solidFill>
-                  <a:srgbClr val="C00000"/>
-                </a:solidFill>
-              </a:rPr>
-              <a:t>git status</a:t>
-            </a:r>
-          </a:p>
-          <a:p>
-            <a:r>
-              <a:rPr lang="en-US" smtClean="0"/>
-              <a:t> </a:t>
-            </a:r>
-            <a:r>
-              <a:rPr lang="en-US" smtClean="0">
-                <a:solidFill>
-                  <a:srgbClr val="C00000"/>
-                </a:solidFill>
-              </a:rPr>
-              <a:t>git commit -m “message”</a:t>
-            </a:r>
-          </a:p>
-          <a:p>
-            <a:r>
-              <a:rPr lang="en-US" smtClean="0"/>
-              <a:t> </a:t>
-            </a:r>
-            <a:r>
-              <a:rPr lang="en-US" smtClean="0">
-                <a:solidFill>
-                  <a:srgbClr val="C00000"/>
-                </a:solidFill>
-              </a:rPr>
-              <a:t>git push origin master</a:t>
-            </a:r>
-          </a:p>
-          <a:p>
-            <a:r>
-              <a:rPr lang="en-US" smtClean="0"/>
-              <a:t>Refresh your GitHub repo</a:t>
-            </a:r>
-          </a:p>
-          <a:p>
+              <a:t>git log</a:t>
+            </a:r>
+            <a:r>
+              <a:rPr lang="en-US" smtClean="0"/>
+              <a:t>)</a:t>
+            </a:r>
             <a:endParaRPr lang="en-US"/>
           </a:p>
         </p:txBody>
@@ -5652,7 +5643,7 @@
     </p:spTree>
     <p:extLst>
       <p:ext uri="{BB962C8B-B14F-4D97-AF65-F5344CB8AC3E}">
-        <p14:creationId xmlns:p14="http://schemas.microsoft.com/office/powerpoint/2010/main" val="4057909759"/>
+        <p14:creationId xmlns:p14="http://schemas.microsoft.com/office/powerpoint/2010/main" val="3631315944"/>
       </p:ext>
     </p:extLst>
   </p:cSld>
@@ -5688,41 +5679,115 @@
       </p:grpSpPr>
       <p:sp>
         <p:nvSpPr>
-          <p:cNvPr id="4" name="Title 3"/>
-          <p:cNvSpPr>
-            <a:spLocks noGrp="1"/>
-          </p:cNvSpPr>
-          <p:nvPr>
-            <p:ph type="ctrTitle"/>
-          </p:nvPr>
-        </p:nvSpPr>
-        <p:spPr/>
-        <p:txBody>
-          <a:bodyPr/>
-          <a:lstStyle/>
-          <a:p>
-            <a:r>
-              <a:rPr lang="en-US" smtClean="0"/>
-              <a:t>IV. Contributing on GitHub</a:t>
-            </a:r>
-            <a:endParaRPr lang="en-US"/>
-          </a:p>
-        </p:txBody>
-      </p:sp>
-      <p:sp>
-        <p:nvSpPr>
-          <p:cNvPr id="5" name="Subtitle 4"/>
-          <p:cNvSpPr>
-            <a:spLocks noGrp="1"/>
-          </p:cNvSpPr>
-          <p:nvPr>
-            <p:ph type="subTitle" idx="1"/>
-          </p:nvPr>
-        </p:nvSpPr>
-        <p:spPr/>
-        <p:txBody>
-          <a:bodyPr/>
-          <a:lstStyle/>
+          <p:cNvPr id="2" name="Title 1"/>
+          <p:cNvSpPr>
+            <a:spLocks noGrp="1"/>
+          </p:cNvSpPr>
+          <p:nvPr>
+            <p:ph type="title"/>
+          </p:nvPr>
+        </p:nvSpPr>
+        <p:spPr/>
+        <p:txBody>
+          <a:bodyPr/>
+          <a:lstStyle/>
+          <a:p>
+            <a:r>
+              <a:rPr lang="en-US" smtClean="0"/>
+              <a:t>Let’s do it again!</a:t>
+            </a:r>
+            <a:endParaRPr lang="en-US"/>
+          </a:p>
+        </p:txBody>
+      </p:sp>
+      <p:sp>
+        <p:nvSpPr>
+          <p:cNvPr id="3" name="Content Placeholder 2"/>
+          <p:cNvSpPr>
+            <a:spLocks noGrp="1"/>
+          </p:cNvSpPr>
+          <p:nvPr>
+            <p:ph idx="1"/>
+          </p:nvPr>
+        </p:nvSpPr>
+        <p:spPr/>
+        <p:txBody>
+          <a:bodyPr/>
+          <a:lstStyle/>
+          <a:p>
+            <a:r>
+              <a:rPr lang="en-US" smtClean="0"/>
+              <a:t>Modify or add a file, then </a:t>
+            </a:r>
+            <a:r>
+              <a:rPr lang="en-US" smtClean="0">
+                <a:solidFill>
+                  <a:srgbClr val="C00000"/>
+                </a:solidFill>
+              </a:rPr>
+              <a:t>git status</a:t>
+            </a:r>
+          </a:p>
+          <a:p>
+            <a:r>
+              <a:rPr lang="en-US" smtClean="0"/>
+              <a:t> </a:t>
+            </a:r>
+            <a:r>
+              <a:rPr lang="en-US" smtClean="0">
+                <a:solidFill>
+                  <a:srgbClr val="C00000"/>
+                </a:solidFill>
+              </a:rPr>
+              <a:t>git add .</a:t>
+            </a:r>
+            <a:r>
+              <a:rPr lang="en-US" smtClean="0"/>
+              <a:t>, then </a:t>
+            </a:r>
+            <a:r>
+              <a:rPr lang="en-US" smtClean="0">
+                <a:solidFill>
+                  <a:srgbClr val="C00000"/>
+                </a:solidFill>
+              </a:rPr>
+              <a:t>git status</a:t>
+            </a:r>
+          </a:p>
+          <a:p>
+            <a:r>
+              <a:rPr lang="en-US" smtClean="0"/>
+              <a:t> </a:t>
+            </a:r>
+            <a:r>
+              <a:rPr lang="en-US" smtClean="0">
+                <a:solidFill>
+                  <a:srgbClr val="C00000"/>
+                </a:solidFill>
+              </a:rPr>
+              <a:t>git commit -m “message”</a:t>
+            </a:r>
+          </a:p>
+          <a:p>
+            <a:r>
+              <a:rPr lang="en-US" smtClean="0"/>
+              <a:t> </a:t>
+            </a:r>
+            <a:r>
+              <a:rPr lang="en-US" smtClean="0">
+                <a:solidFill>
+                  <a:srgbClr val="C00000"/>
+                </a:solidFill>
+              </a:rPr>
+              <a:t>git push origin master</a:t>
+            </a:r>
+          </a:p>
+          <a:p>
+            <a:r>
+              <a:rPr lang="en-US" smtClean="0"/>
+              <a:t>Refresh your GitHub repo</a:t>
+            </a:r>
+          </a:p>
           <a:p>
             <a:endParaRPr lang="en-US"/>
           </a:p>
@@ -5731,7 +5796,7 @@
     </p:spTree>
     <p:extLst>
       <p:ext uri="{BB962C8B-B14F-4D97-AF65-F5344CB8AC3E}">
-        <p14:creationId xmlns:p14="http://schemas.microsoft.com/office/powerpoint/2010/main" val="2925110185"/>
+        <p14:creationId xmlns:p14="http://schemas.microsoft.com/office/powerpoint/2010/main" val="4057909759"/>
       </p:ext>
     </p:extLst>
   </p:cSld>
@@ -5767,6 +5832,85 @@
       </p:grpSpPr>
       <p:sp>
         <p:nvSpPr>
+          <p:cNvPr id="4" name="Title 3"/>
+          <p:cNvSpPr>
+            <a:spLocks noGrp="1"/>
+          </p:cNvSpPr>
+          <p:nvPr>
+            <p:ph type="ctrTitle"/>
+          </p:nvPr>
+        </p:nvSpPr>
+        <p:spPr/>
+        <p:txBody>
+          <a:bodyPr/>
+          <a:lstStyle/>
+          <a:p>
+            <a:r>
+              <a:rPr lang="en-US" smtClean="0"/>
+              <a:t>IV. Contributing on GitHub</a:t>
+            </a:r>
+            <a:endParaRPr lang="en-US"/>
+          </a:p>
+        </p:txBody>
+      </p:sp>
+      <p:sp>
+        <p:nvSpPr>
+          <p:cNvPr id="5" name="Subtitle 4"/>
+          <p:cNvSpPr>
+            <a:spLocks noGrp="1"/>
+          </p:cNvSpPr>
+          <p:nvPr>
+            <p:ph type="subTitle" idx="1"/>
+          </p:nvPr>
+        </p:nvSpPr>
+        <p:spPr/>
+        <p:txBody>
+          <a:bodyPr/>
+          <a:lstStyle/>
+          <a:p>
+            <a:endParaRPr lang="en-US"/>
+          </a:p>
+        </p:txBody>
+      </p:sp>
+    </p:spTree>
+    <p:extLst>
+      <p:ext uri="{BB962C8B-B14F-4D97-AF65-F5344CB8AC3E}">
+        <p14:creationId xmlns:p14="http://schemas.microsoft.com/office/powerpoint/2010/main" val="2925110185"/>
+      </p:ext>
+    </p:extLst>
+  </p:cSld>
+  <p:clrMapOvr>
+    <a:masterClrMapping/>
+  </p:clrMapOvr>
+  <p:timing>
+    <p:tnLst>
+      <p:par>
+        <p:cTn id="1" dur="indefinite" restart="never" nodeType="tmRoot"/>
+      </p:par>
+    </p:tnLst>
+  </p:timing>
+</p:sld>
+</file>
+
+<file path=ppt/slides/slide25.xml><?xml version="1.0" encoding="utf-8"?>
+<p:sld xmlns:a="http://schemas.openxmlformats.org/drawingml/2006/main" xmlns:r="http://schemas.openxmlformats.org/officeDocument/2006/relationships" xmlns:p="http://schemas.openxmlformats.org/presentationml/2006/main">
+  <p:cSld>
+    <p:spTree>
+      <p:nvGrpSpPr>
+        <p:cNvPr id="1" name=""/>
+        <p:cNvGrpSpPr/>
+        <p:nvPr/>
+      </p:nvGrpSpPr>
+      <p:grpSpPr>
+        <a:xfrm>
+          <a:off x="0" y="0"/>
+          <a:ext cx="0" cy="0"/>
+          <a:chOff x="0" y="0"/>
+          <a:chExt cx="0" cy="0"/>
+        </a:xfrm>
+      </p:grpSpPr>
+      <p:sp>
+        <p:nvSpPr>
           <p:cNvPr id="2" name="Title 1"/>
           <p:cNvSpPr>
             <a:spLocks noGrp="1"/>
@@ -5911,7 +6055,7 @@
 </p:sld>
 </file>
 
-<file path=ppt/slides/slide25.xml><?xml version="1.0" encoding="utf-8"?>
+<file path=ppt/slides/slide26.xml><?xml version="1.0" encoding="utf-8"?>
 <p:sld xmlns:a="http://schemas.openxmlformats.org/drawingml/2006/main" xmlns:r="http://schemas.openxmlformats.org/officeDocument/2006/relationships" xmlns:p="http://schemas.openxmlformats.org/presentationml/2006/main">
   <p:cSld>
     <p:spTree>
@@ -6027,7 +6171,7 @@
 </p:sld>
 </file>
 
-<file path=ppt/slides/slide26.xml><?xml version="1.0" encoding="utf-8"?>
+<file path=ppt/slides/slide27.xml><?xml version="1.0" encoding="utf-8"?>
 <p:sld xmlns:a="http://schemas.openxmlformats.org/drawingml/2006/main" xmlns:r="http://schemas.openxmlformats.org/officeDocument/2006/relationships" xmlns:p="http://schemas.openxmlformats.org/presentationml/2006/main">
   <p:cSld>
     <p:spTree>
@@ -6133,8 +6277,13 @@
           <a:p>
             <a:r>
               <a:rPr lang="en-US" smtClean="0"/>
-              <a:t>Write something using Markdown</a:t>
-            </a:r>
+              <a:t>Write something using </a:t>
+            </a:r>
+            <a:r>
+              <a:rPr lang="en-US" smtClean="0"/>
+              <a:t>Markdown (optional)</a:t>
+            </a:r>
+            <a:endParaRPr lang="en-US" smtClean="0"/>
           </a:p>
           <a:p>
             <a:r>
@@ -6173,7 +6322,7 @@
 </p:sld>
 </file>
 
-<file path=ppt/slides/slide27.xml><?xml version="1.0" encoding="utf-8"?>
+<file path=ppt/slides/slide28.xml><?xml version="1.0" encoding="utf-8"?>
 <p:sld xmlns:a="http://schemas.openxmlformats.org/drawingml/2006/main" xmlns:r="http://schemas.openxmlformats.org/officeDocument/2006/relationships" xmlns:p="http://schemas.openxmlformats.org/presentationml/2006/main">
   <p:cSld>
     <p:spTree>
@@ -6289,232 +6438,6 @@
 </p:sld>
 </file>
 
-<file path=ppt/slides/slide28.xml><?xml version="1.0" encoding="utf-8"?>
-<p:sld xmlns:a="http://schemas.openxmlformats.org/drawingml/2006/main" xmlns:r="http://schemas.openxmlformats.org/officeDocument/2006/relationships" xmlns:p="http://schemas.openxmlformats.org/presentationml/2006/main">
-  <p:cSld>
-    <p:spTree>
-      <p:nvGrpSpPr>
-        <p:cNvPr id="1" name=""/>
-        <p:cNvGrpSpPr/>
-        <p:nvPr/>
-      </p:nvGrpSpPr>
-      <p:grpSpPr>
-        <a:xfrm>
-          <a:off x="0" y="0"/>
-          <a:ext cx="0" cy="0"/>
-          <a:chOff x="0" y="0"/>
-          <a:chExt cx="0" cy="0"/>
-        </a:xfrm>
-      </p:grpSpPr>
-      <p:sp>
-        <p:nvSpPr>
-          <p:cNvPr id="2" name="Title 1"/>
-          <p:cNvSpPr>
-            <a:spLocks noGrp="1"/>
-          </p:cNvSpPr>
-          <p:nvPr>
-            <p:ph type="title"/>
-          </p:nvPr>
-        </p:nvSpPr>
-        <p:spPr/>
-        <p:txBody>
-          <a:bodyPr/>
-          <a:lstStyle/>
-          <a:p>
-            <a:r>
-              <a:rPr lang="en-US" smtClean="0"/>
-              <a:t>Sync your “DAT4-students” fork</a:t>
-            </a:r>
-            <a:endParaRPr lang="en-US"/>
-          </a:p>
-        </p:txBody>
-      </p:sp>
-      <p:sp>
-        <p:nvSpPr>
-          <p:cNvPr id="3" name="Content Placeholder 2"/>
-          <p:cNvSpPr>
-            <a:spLocks noGrp="1"/>
-          </p:cNvSpPr>
-          <p:nvPr>
-            <p:ph idx="1"/>
-          </p:nvPr>
-        </p:nvSpPr>
-        <p:spPr>
-          <a:xfrm>
-            <a:off x="457200" y="1600200"/>
-            <a:ext cx="8229600" cy="4724400"/>
-          </a:xfrm>
-        </p:spPr>
-        <p:txBody>
-          <a:bodyPr>
-            <a:normAutofit fontScale="92500" lnSpcReduction="10000"/>
-          </a:bodyPr>
-          <a:lstStyle/>
-          <a:p>
-            <a:r>
-              <a:rPr lang="en-US" smtClean="0"/>
-              <a:t>Files have been added to DAT4-students</a:t>
-            </a:r>
-          </a:p>
-          <a:p>
-            <a:r>
-              <a:rPr lang="en-US" smtClean="0"/>
-              <a:t>Add an “upstream” remote (one-time operation):</a:t>
-            </a:r>
-          </a:p>
-          <a:p>
-            <a:pPr lvl="1"/>
-            <a:r>
-              <a:rPr lang="en-US" smtClean="0"/>
-              <a:t> </a:t>
-            </a:r>
-            <a:r>
-              <a:rPr lang="en-US" smtClean="0">
-                <a:solidFill>
-                  <a:srgbClr val="C00000"/>
-                </a:solidFill>
-              </a:rPr>
-              <a:t>git remote add upstream &lt;Kevin’s URL&gt;</a:t>
-            </a:r>
-          </a:p>
-          <a:p>
-            <a:pPr lvl="1"/>
-            <a:r>
-              <a:rPr lang="en-US" smtClean="0"/>
-              <a:t>Check that it worked: </a:t>
-            </a:r>
-            <a:r>
-              <a:rPr lang="en-US" smtClean="0">
-                <a:solidFill>
-                  <a:srgbClr val="C00000"/>
-                </a:solidFill>
-              </a:rPr>
-              <a:t>git remote </a:t>
-            </a:r>
-            <a:r>
-              <a:rPr lang="en-US">
-                <a:solidFill>
-                  <a:srgbClr val="C00000"/>
-                </a:solidFill>
-              </a:rPr>
-              <a:t>-</a:t>
-            </a:r>
-            <a:r>
-              <a:rPr lang="en-US" smtClean="0">
-                <a:solidFill>
-                  <a:srgbClr val="C00000"/>
-                </a:solidFill>
-              </a:rPr>
-              <a:t>v</a:t>
-            </a:r>
-          </a:p>
-          <a:p>
-            <a:r>
-              <a:rPr lang="en-US" smtClean="0"/>
-              <a:t>Pull the changes from the upstream:</a:t>
-            </a:r>
-          </a:p>
-          <a:p>
-            <a:pPr lvl="1"/>
-            <a:r>
-              <a:rPr lang="en-US" smtClean="0"/>
-              <a:t>Like updating your local files from Dropbox</a:t>
-            </a:r>
-          </a:p>
-          <a:p>
-            <a:pPr lvl="1"/>
-            <a:r>
-              <a:rPr lang="en-US" smtClean="0"/>
-              <a:t> </a:t>
-            </a:r>
-            <a:r>
-              <a:rPr lang="en-US" smtClean="0">
-                <a:solidFill>
-                  <a:srgbClr val="C00000"/>
-                </a:solidFill>
-              </a:rPr>
-              <a:t>git pull upstream master</a:t>
-            </a:r>
-          </a:p>
-          <a:p>
-            <a:pPr lvl="1"/>
-            <a:r>
-              <a:rPr lang="en-US" smtClean="0"/>
-              <a:t>Pull = fetch + merge (basically)</a:t>
-            </a:r>
-          </a:p>
-          <a:p>
-            <a:r>
-              <a:rPr lang="en-US"/>
-              <a:t>Push </a:t>
-            </a:r>
-            <a:r>
-              <a:rPr lang="en-US" smtClean="0"/>
-              <a:t>the changes </a:t>
-            </a:r>
-            <a:r>
-              <a:rPr lang="en-US"/>
-              <a:t>up to GitHub (optional):</a:t>
-            </a:r>
-          </a:p>
-          <a:p>
-            <a:pPr lvl="1"/>
-            <a:r>
-              <a:rPr lang="en-US" smtClean="0"/>
-              <a:t> </a:t>
-            </a:r>
-            <a:r>
-              <a:rPr lang="en-US" smtClean="0">
-                <a:solidFill>
-                  <a:srgbClr val="C00000"/>
-                </a:solidFill>
-              </a:rPr>
-              <a:t>git </a:t>
-            </a:r>
-            <a:r>
-              <a:rPr lang="en-US">
-                <a:solidFill>
-                  <a:srgbClr val="C00000"/>
-                </a:solidFill>
-              </a:rPr>
-              <a:t>push origin </a:t>
-            </a:r>
-            <a:r>
-              <a:rPr lang="en-US" smtClean="0">
-                <a:solidFill>
-                  <a:srgbClr val="C00000"/>
-                </a:solidFill>
-              </a:rPr>
-              <a:t>master</a:t>
-            </a:r>
-            <a:endParaRPr lang="en-US">
-              <a:solidFill>
-                <a:srgbClr val="C00000"/>
-              </a:solidFill>
-            </a:endParaRPr>
-          </a:p>
-        </p:txBody>
-      </p:sp>
-    </p:spTree>
-    <p:extLst>
-      <p:ext uri="{BB962C8B-B14F-4D97-AF65-F5344CB8AC3E}">
-        <p14:creationId xmlns:p14="http://schemas.microsoft.com/office/powerpoint/2010/main" val="1655227689"/>
-      </p:ext>
-    </p:extLst>
-  </p:cSld>
-  <p:clrMapOvr>
-    <a:masterClrMapping/>
-  </p:clrMapOvr>
-  <p:timing>
-    <p:tnLst>
-      <p:par>
-        <p:cTn id="1" dur="indefinite" restart="never" nodeType="tmRoot"/>
-      </p:par>
-    </p:tnLst>
-  </p:timing>
-</p:sld>
-</file>
-
 <file path=ppt/slides/slide29.xml><?xml version="1.0" encoding="utf-8"?>
 <p:sld xmlns:a="http://schemas.openxmlformats.org/drawingml/2006/main" xmlns:r="http://schemas.openxmlformats.org/officeDocument/2006/relationships" xmlns:p="http://schemas.openxmlformats.org/presentationml/2006/main">
   <p:cSld>
@@ -6549,7 +6472,7 @@
           <a:p>
             <a:r>
               <a:rPr lang="en-US" smtClean="0"/>
-              <a:t>Recipe for submitting homework</a:t>
+              <a:t>Sync your “DAT4-students” fork</a:t>
             </a:r>
             <a:endParaRPr lang="en-US"/>
           </a:p>
@@ -6567,20 +6490,88 @@
         </p:nvSpPr>
         <p:spPr>
           <a:xfrm>
-            <a:off x="457200" y="1447800"/>
-            <a:ext cx="8229600" cy="4876800"/>
+            <a:off x="457200" y="1600200"/>
+            <a:ext cx="8229600" cy="4724400"/>
           </a:xfrm>
         </p:spPr>
         <p:txBody>
           <a:bodyPr>
-            <a:normAutofit/>
+            <a:normAutofit fontScale="92500" lnSpcReduction="10000"/>
           </a:bodyPr>
           <a:lstStyle/>
           <a:p>
-            <a:pPr marL="514350" indent="-514350">
-              <a:buFont typeface="+mj-lt"/>
-              <a:buAutoNum type="arabicPeriod"/>
-            </a:pPr>
+            <a:r>
+              <a:rPr lang="en-US" smtClean="0"/>
+              <a:t>Files have been added to DAT4-students</a:t>
+            </a:r>
+          </a:p>
+          <a:p>
+            <a:r>
+              <a:rPr lang="en-US" smtClean="0"/>
+              <a:t>Add an “upstream” remote (one-time operation):</a:t>
+            </a:r>
+          </a:p>
+          <a:p>
+            <a:pPr lvl="1"/>
+            <a:r>
+              <a:rPr lang="en-US" smtClean="0"/>
+              <a:t> </a:t>
+            </a:r>
+            <a:r>
+              <a:rPr lang="en-US" smtClean="0">
+                <a:solidFill>
+                  <a:srgbClr val="C00000"/>
+                </a:solidFill>
+              </a:rPr>
+              <a:t>git remote add upstream &lt;Kevin’s URL&gt;</a:t>
+            </a:r>
+          </a:p>
+          <a:p>
+            <a:pPr lvl="1"/>
+            <a:r>
+              <a:rPr lang="en-US" smtClean="0"/>
+              <a:t>Check that it worked: </a:t>
+            </a:r>
+            <a:r>
+              <a:rPr lang="en-US" smtClean="0">
+                <a:solidFill>
+                  <a:srgbClr val="C00000"/>
+                </a:solidFill>
+              </a:rPr>
+              <a:t>git remote </a:t>
+            </a:r>
+            <a:r>
+              <a:rPr lang="en-US">
+                <a:solidFill>
+                  <a:srgbClr val="C00000"/>
+                </a:solidFill>
+              </a:rPr>
+              <a:t>-</a:t>
+            </a:r>
+            <a:r>
+              <a:rPr lang="en-US" smtClean="0">
+                <a:solidFill>
+                  <a:srgbClr val="C00000"/>
+                </a:solidFill>
+              </a:rPr>
+              <a:t>v</a:t>
+            </a:r>
+          </a:p>
+          <a:p>
+            <a:r>
+              <a:rPr lang="en-US" smtClean="0"/>
+              <a:t>Pull the changes from the upstream:</a:t>
+            </a:r>
+          </a:p>
+          <a:p>
+            <a:pPr lvl="1"/>
+            <a:r>
+              <a:rPr lang="en-US" smtClean="0"/>
+              <a:t>Like updating your local files from Dropbox</a:t>
+            </a:r>
+          </a:p>
+          <a:p>
+            <a:pPr lvl="1"/>
             <a:r>
               <a:rPr lang="en-US" smtClean="0"/>
               <a:t> </a:t>
@@ -6593,23 +6584,30 @@
               </a:rPr>
               <a:t>git pull upstream master</a:t>
             </a:r>
-            <a:endParaRPr lang="en-US" smtClean="0"/>
-          </a:p>
-          <a:p>
-            <a:pPr marL="514350" indent="-514350">
-              <a:buFont typeface="+mj-lt"/>
-              <a:buAutoNum type="arabicPeriod"/>
-            </a:pPr>
-            <a:r>
-              <a:rPr lang="en-US" smtClean="0"/>
-              <a:t>Copy your homework file(s) to your folder</a:t>
-            </a:r>
-          </a:p>
-          <a:p>
-            <a:pPr marL="514350" indent="-514350">
-              <a:buFont typeface="+mj-lt"/>
-              <a:buAutoNum type="arabicPeriod"/>
-            </a:pPr>
+          </a:p>
+          <a:p>
+            <a:pPr lvl="1"/>
+            <a:r>
+              <a:rPr lang="en-US" smtClean="0"/>
+              <a:t>Pull = fetch + merge (basically)</a:t>
+            </a:r>
+          </a:p>
+          <a:p>
+            <a:r>
+              <a:rPr lang="en-US"/>
+              <a:t>Push </a:t>
+            </a:r>
+            <a:r>
+              <a:rPr lang="en-US" smtClean="0"/>
+              <a:t>the changes </a:t>
+            </a:r>
+            <a:r>
+              <a:rPr lang="en-US"/>
+              <a:t>up to GitHub (optional):</a:t>
+            </a:r>
+          </a:p>
+          <a:p>
+            <a:pPr lvl="1"/>
             <a:r>
               <a:rPr lang="en-US" smtClean="0"/>
               <a:t> </a:t>
@@ -6620,11 +6618,15 @@
                   <a:srgbClr val="C00000"/>
                 </a:solidFill>
               </a:rPr>
-              <a:t>git add .</a:t>
-            </a:r>
-            <a:r>
-              <a:rPr lang="en-US" smtClean="0"/>
-              <a:t> or </a:t>
+              <a:t>git </a:t>
+            </a:r>
+            <a:r>
+              <a:rPr lang="en-US">
+                <a:solidFill>
+                  <a:srgbClr val="C00000"/>
+                </a:solidFill>
+              </a:rPr>
+              <a:t>push origin </a:t>
             </a:r>
             <a:r>
               <a:rPr lang="en-US" smtClean="0">
@@ -6632,80 +6634,20 @@
                   <a:srgbClr val="C00000"/>
                 </a:solidFill>
               </a:rPr>
-              <a:t>git add &lt;filename&gt;</a:t>
-            </a:r>
-          </a:p>
-          <a:p>
-            <a:pPr marL="514350" indent="-514350">
-              <a:buFont typeface="+mj-lt"/>
-              <a:buAutoNum type="arabicPeriod"/>
-            </a:pPr>
-            <a:r>
-              <a:rPr lang="en-US"/>
-              <a:t> </a:t>
-            </a:r>
-            <a:r>
-              <a:rPr lang="en-US" smtClean="0">
-                <a:solidFill>
-                  <a:srgbClr val="C00000"/>
-                </a:solidFill>
-              </a:rPr>
-              <a:t>git status</a:t>
-            </a:r>
-          </a:p>
-          <a:p>
-            <a:pPr marL="514350" indent="-514350">
-              <a:buFont typeface="+mj-lt"/>
-              <a:buAutoNum type="arabicPeriod"/>
-            </a:pPr>
-            <a:r>
-              <a:rPr lang="en-US" smtClean="0"/>
-              <a:t> </a:t>
-            </a:r>
-            <a:r>
-              <a:rPr lang="en-US" smtClean="0">
-                <a:solidFill>
-                  <a:srgbClr val="C00000"/>
-                </a:solidFill>
-              </a:rPr>
-              <a:t>git commit -m “message”</a:t>
-            </a:r>
-          </a:p>
-          <a:p>
-            <a:pPr marL="514350" indent="-514350">
-              <a:buFont typeface="+mj-lt"/>
-              <a:buAutoNum type="arabicPeriod"/>
-            </a:pPr>
-            <a:r>
-              <a:rPr lang="en-US" smtClean="0"/>
-              <a:t> </a:t>
-            </a:r>
-            <a:r>
-              <a:rPr lang="en-US" smtClean="0">
-                <a:solidFill>
-                  <a:srgbClr val="C00000"/>
-                </a:solidFill>
-              </a:rPr>
-              <a:t>git push origin master</a:t>
-            </a:r>
-          </a:p>
-          <a:p>
-            <a:pPr marL="514350" indent="-514350">
-              <a:buFont typeface="+mj-lt"/>
-              <a:buAutoNum type="arabicPeriod"/>
-            </a:pPr>
-            <a:r>
-              <a:rPr lang="en-US" smtClean="0"/>
-              <a:t>Create pull request on GitHub</a:t>
-            </a:r>
-            <a:endParaRPr lang="en-US"/>
+              <a:t>master</a:t>
+            </a:r>
+            <a:endParaRPr lang="en-US">
+              <a:solidFill>
+                <a:srgbClr val="C00000"/>
+              </a:solidFill>
+            </a:endParaRPr>
           </a:p>
         </p:txBody>
       </p:sp>
     </p:spTree>
     <p:extLst>
       <p:ext uri="{BB962C8B-B14F-4D97-AF65-F5344CB8AC3E}">
-        <p14:creationId xmlns:p14="http://schemas.microsoft.com/office/powerpoint/2010/main" val="1158024077"/>
+        <p14:creationId xmlns:p14="http://schemas.microsoft.com/office/powerpoint/2010/main" val="1655227689"/>
       </p:ext>
     </p:extLst>
   </p:cSld>
@@ -6820,50 +6762,199 @@
       </p:grpSpPr>
       <p:sp>
         <p:nvSpPr>
-          <p:cNvPr id="4" name="Title 3"/>
-          <p:cNvSpPr>
-            <a:spLocks noGrp="1"/>
-          </p:cNvSpPr>
-          <p:nvPr>
-            <p:ph type="ctrTitle"/>
-          </p:nvPr>
-        </p:nvSpPr>
-        <p:spPr/>
-        <p:txBody>
-          <a:bodyPr/>
-          <a:lstStyle/>
-          <a:p>
-            <a:r>
-              <a:rPr lang="en-US" smtClean="0"/>
-              <a:t>V. Bonus Content</a:t>
-            </a:r>
-            <a:endParaRPr lang="en-US"/>
-          </a:p>
-        </p:txBody>
-      </p:sp>
-      <p:sp>
-        <p:nvSpPr>
-          <p:cNvPr id="5" name="Subtitle 4"/>
-          <p:cNvSpPr>
-            <a:spLocks noGrp="1"/>
-          </p:cNvSpPr>
-          <p:nvPr>
-            <p:ph type="subTitle" idx="1"/>
-          </p:nvPr>
-        </p:nvSpPr>
-        <p:spPr/>
-        <p:txBody>
-          <a:bodyPr/>
-          <a:lstStyle/>
-          <a:p>
-            <a:endParaRPr lang="en-US"/>
+          <p:cNvPr id="2" name="Title 1"/>
+          <p:cNvSpPr>
+            <a:spLocks noGrp="1"/>
+          </p:cNvSpPr>
+          <p:nvPr>
+            <p:ph type="title"/>
+          </p:nvPr>
+        </p:nvSpPr>
+        <p:spPr/>
+        <p:txBody>
+          <a:bodyPr/>
+          <a:lstStyle/>
+          <a:p>
+            <a:r>
+              <a:rPr lang="en-US" smtClean="0"/>
+              <a:t>Recipe for submitting homework</a:t>
+            </a:r>
+            <a:endParaRPr lang="en-US"/>
+          </a:p>
+        </p:txBody>
+      </p:sp>
+      <p:sp>
+        <p:nvSpPr>
+          <p:cNvPr id="3" name="Content Placeholder 2"/>
+          <p:cNvSpPr>
+            <a:spLocks noGrp="1"/>
+          </p:cNvSpPr>
+          <p:nvPr>
+            <p:ph idx="1"/>
+          </p:nvPr>
+        </p:nvSpPr>
+        <p:spPr>
+          <a:xfrm>
+            <a:off x="457200" y="1447800"/>
+            <a:ext cx="8229600" cy="4876800"/>
+          </a:xfrm>
+        </p:spPr>
+        <p:txBody>
+          <a:bodyPr>
+            <a:normAutofit/>
+          </a:bodyPr>
+          <a:lstStyle/>
+          <a:p>
+            <a:pPr marL="514350" indent="-514350">
+              <a:buFont typeface="+mj-lt"/>
+              <a:buAutoNum type="arabicPeriod"/>
+            </a:pPr>
+            <a:r>
+              <a:rPr lang="en-US"/>
+              <a:t>Navigate to DAT4-students (locally)</a:t>
+            </a:r>
+          </a:p>
+          <a:p>
+            <a:pPr marL="514350" indent="-514350">
+              <a:buFont typeface="+mj-lt"/>
+              <a:buAutoNum type="arabicPeriod"/>
+            </a:pPr>
+            <a:r>
+              <a:rPr lang="en-US" smtClean="0"/>
+              <a:t> </a:t>
+            </a:r>
+            <a:r>
+              <a:rPr lang="en-US" smtClean="0">
+                <a:solidFill>
+                  <a:srgbClr val="C00000"/>
+                </a:solidFill>
+              </a:rPr>
+              <a:t>git pull upstream master</a:t>
+            </a:r>
+            <a:endParaRPr lang="en-US" smtClean="0"/>
+          </a:p>
+          <a:p>
+            <a:pPr marL="514350" indent="-514350">
+              <a:buFont typeface="+mj-lt"/>
+              <a:buAutoNum type="arabicPeriod"/>
+            </a:pPr>
+            <a:r>
+              <a:rPr lang="en-US" smtClean="0"/>
+              <a:t>Copy your homework file(s) to your folder</a:t>
+            </a:r>
+          </a:p>
+          <a:p>
+            <a:pPr marL="514350" indent="-514350">
+              <a:buFont typeface="+mj-lt"/>
+              <a:buAutoNum type="arabicPeriod"/>
+            </a:pPr>
+            <a:r>
+              <a:rPr lang="en-US" smtClean="0"/>
+              <a:t> </a:t>
+            </a:r>
+            <a:r>
+              <a:rPr lang="en-US" smtClean="0">
+                <a:solidFill>
+                  <a:srgbClr val="C00000"/>
+                </a:solidFill>
+              </a:rPr>
+              <a:t>git add .</a:t>
+            </a:r>
+            <a:r>
+              <a:rPr lang="en-US" smtClean="0"/>
+              <a:t> or </a:t>
+            </a:r>
+            <a:r>
+              <a:rPr lang="en-US" smtClean="0">
+                <a:solidFill>
+                  <a:srgbClr val="C00000"/>
+                </a:solidFill>
+              </a:rPr>
+              <a:t>git add &lt;filename&gt;</a:t>
+            </a:r>
+          </a:p>
+          <a:p>
+            <a:pPr marL="514350" indent="-514350">
+              <a:buFont typeface="+mj-lt"/>
+              <a:buAutoNum type="arabicPeriod"/>
+            </a:pPr>
+            <a:r>
+              <a:rPr lang="en-US"/>
+              <a:t> </a:t>
+            </a:r>
+            <a:r>
+              <a:rPr lang="en-US" smtClean="0">
+                <a:solidFill>
+                  <a:srgbClr val="C00000"/>
+                </a:solidFill>
+              </a:rPr>
+              <a:t>git status</a:t>
+            </a:r>
+          </a:p>
+          <a:p>
+            <a:pPr marL="514350" indent="-514350">
+              <a:buFont typeface="+mj-lt"/>
+              <a:buAutoNum type="arabicPeriod"/>
+            </a:pPr>
+            <a:r>
+              <a:rPr lang="en-US" smtClean="0"/>
+              <a:t> </a:t>
+            </a:r>
+            <a:r>
+              <a:rPr lang="en-US" smtClean="0">
+                <a:solidFill>
+                  <a:srgbClr val="C00000"/>
+                </a:solidFill>
+              </a:rPr>
+              <a:t>git commit -m “message”</a:t>
+            </a:r>
+          </a:p>
+          <a:p>
+            <a:pPr marL="514350" indent="-514350">
+              <a:buFont typeface="+mj-lt"/>
+              <a:buAutoNum type="arabicPeriod"/>
+            </a:pPr>
+            <a:r>
+              <a:rPr lang="en-US" smtClean="0"/>
+              <a:t> </a:t>
+            </a:r>
+            <a:r>
+              <a:rPr lang="en-US" smtClean="0">
+                <a:solidFill>
+                  <a:srgbClr val="C00000"/>
+                </a:solidFill>
+              </a:rPr>
+              <a:t>git push origin master</a:t>
+            </a:r>
+          </a:p>
+          <a:p>
+            <a:pPr marL="514350" indent="-514350">
+              <a:buFont typeface="+mj-lt"/>
+              <a:buAutoNum type="arabicPeriod"/>
+            </a:pPr>
+            <a:r>
+              <a:rPr lang="en-US" smtClean="0"/>
+              <a:t>Create </a:t>
+            </a:r>
+            <a:r>
+              <a:rPr lang="en-US" smtClean="0"/>
+              <a:t>GitHub pull </a:t>
+            </a:r>
+            <a:r>
+              <a:rPr lang="en-US" smtClean="0"/>
+              <a:t>request </a:t>
+            </a:r>
+            <a:r>
+              <a:rPr lang="en-US" smtClean="0"/>
+              <a:t>(from your fork)</a:t>
+            </a:r>
           </a:p>
         </p:txBody>
       </p:sp>
     </p:spTree>
     <p:extLst>
       <p:ext uri="{BB962C8B-B14F-4D97-AF65-F5344CB8AC3E}">
-        <p14:creationId xmlns:p14="http://schemas.microsoft.com/office/powerpoint/2010/main" val="2910544581"/>
+        <p14:creationId xmlns:p14="http://schemas.microsoft.com/office/powerpoint/2010/main" val="1158024077"/>
       </p:ext>
     </p:extLst>
   </p:cSld>
@@ -6899,117 +6990,41 @@
       </p:grpSpPr>
       <p:sp>
         <p:nvSpPr>
-          <p:cNvPr id="2" name="Title 1"/>
-          <p:cNvSpPr>
-            <a:spLocks noGrp="1"/>
-          </p:cNvSpPr>
-          <p:nvPr>
-            <p:ph type="title"/>
-          </p:nvPr>
-        </p:nvSpPr>
-        <p:spPr/>
-        <p:txBody>
-          <a:bodyPr/>
-          <a:lstStyle/>
-          <a:p>
-            <a:r>
-              <a:rPr lang="en-US" smtClean="0"/>
-              <a:t>Two ways to initialize Git</a:t>
-            </a:r>
-            <a:endParaRPr lang="en-US"/>
-          </a:p>
-        </p:txBody>
-      </p:sp>
-      <p:sp>
-        <p:nvSpPr>
-          <p:cNvPr id="3" name="Content Placeholder 2"/>
-          <p:cNvSpPr>
-            <a:spLocks noGrp="1"/>
-          </p:cNvSpPr>
-          <p:nvPr>
-            <p:ph idx="1"/>
-          </p:nvPr>
-        </p:nvSpPr>
-        <p:spPr/>
-        <p:txBody>
-          <a:bodyPr/>
-          <a:lstStyle/>
-          <a:p>
-            <a:r>
-              <a:rPr lang="en-US" smtClean="0"/>
-              <a:t>Initialize on GitHub:</a:t>
-            </a:r>
-          </a:p>
-          <a:p>
-            <a:pPr lvl="1"/>
-            <a:r>
-              <a:rPr lang="en-US" smtClean="0"/>
-              <a:t>Create a repo on GitHub (with README)</a:t>
-            </a:r>
-          </a:p>
-          <a:p>
-            <a:pPr lvl="1"/>
-            <a:r>
-              <a:rPr lang="en-US" smtClean="0"/>
-              <a:t>Clone to your local machine</a:t>
-            </a:r>
-          </a:p>
-          <a:p>
-            <a:r>
-              <a:rPr lang="en-US" smtClean="0"/>
-              <a:t>Initialize locally:</a:t>
-            </a:r>
-          </a:p>
-          <a:p>
-            <a:pPr lvl="1"/>
-            <a:r>
-              <a:rPr lang="en-US" smtClean="0"/>
-              <a:t>Initialize Git in existing local directory: </a:t>
-            </a:r>
-            <a:r>
-              <a:rPr lang="en-US" smtClean="0">
-                <a:solidFill>
-                  <a:srgbClr val="C00000"/>
-                </a:solidFill>
-              </a:rPr>
-              <a:t>git </a:t>
-            </a:r>
-            <a:r>
-              <a:rPr lang="en-US" err="1" smtClean="0">
-                <a:solidFill>
-                  <a:srgbClr val="C00000"/>
-                </a:solidFill>
-              </a:rPr>
-              <a:t>init</a:t>
-            </a:r>
-            <a:endParaRPr lang="en-US" smtClean="0">
-              <a:solidFill>
-                <a:srgbClr val="C00000"/>
-              </a:solidFill>
-            </a:endParaRPr>
-          </a:p>
-          <a:p>
-            <a:pPr lvl="1"/>
-            <a:r>
-              <a:rPr lang="en-US" smtClean="0"/>
-              <a:t>Create a repo on GitHub (without README)</a:t>
-            </a:r>
-          </a:p>
-          <a:p>
-            <a:pPr lvl="1"/>
-            <a:r>
-              <a:rPr lang="en-US" smtClean="0"/>
-              <a:t>Add remote: </a:t>
-            </a:r>
-            <a:r>
-              <a:rPr lang="en-US" smtClean="0">
-                <a:solidFill>
-                  <a:srgbClr val="C00000"/>
-                </a:solidFill>
-              </a:rPr>
-              <a:t>git remote add origin &lt;URL&gt;</a:t>
-            </a:r>
-          </a:p>
+          <p:cNvPr id="4" name="Title 3"/>
+          <p:cNvSpPr>
+            <a:spLocks noGrp="1"/>
+          </p:cNvSpPr>
+          <p:nvPr>
+            <p:ph type="ctrTitle"/>
+          </p:nvPr>
+        </p:nvSpPr>
+        <p:spPr/>
+        <p:txBody>
+          <a:bodyPr/>
+          <a:lstStyle/>
+          <a:p>
+            <a:r>
+              <a:rPr lang="en-US" smtClean="0"/>
+              <a:t>V. Bonus Content</a:t>
+            </a:r>
+            <a:endParaRPr lang="en-US"/>
+          </a:p>
+        </p:txBody>
+      </p:sp>
+      <p:sp>
+        <p:nvSpPr>
+          <p:cNvPr id="5" name="Subtitle 4"/>
+          <p:cNvSpPr>
+            <a:spLocks noGrp="1"/>
+          </p:cNvSpPr>
+          <p:nvPr>
+            <p:ph type="subTitle" idx="1"/>
+          </p:nvPr>
+        </p:nvSpPr>
+        <p:spPr/>
+        <p:txBody>
+          <a:bodyPr/>
+          <a:lstStyle/>
           <a:p>
             <a:endParaRPr lang="en-US"/>
           </a:p>
@@ -7018,7 +7033,7 @@
     </p:spTree>
     <p:extLst>
       <p:ext uri="{BB962C8B-B14F-4D97-AF65-F5344CB8AC3E}">
-        <p14:creationId xmlns:p14="http://schemas.microsoft.com/office/powerpoint/2010/main" val="1526738873"/>
+        <p14:creationId xmlns:p14="http://schemas.microsoft.com/office/powerpoint/2010/main" val="2910544581"/>
       </p:ext>
     </p:extLst>
   </p:cSld>
@@ -7069,7 +7084,7 @@
           <a:p>
             <a:r>
               <a:rPr lang="en-US" smtClean="0"/>
-              <a:t>Deleting or moving a repo</a:t>
+              <a:t>Two ways to initialize Git</a:t>
             </a:r>
             <a:endParaRPr lang="en-US"/>
           </a:p>
@@ -7092,41 +7107,80 @@
           <a:p>
             <a:r>
               <a:rPr lang="en-US" smtClean="0"/>
-              <a:t>Deleting a GitHub repo:</a:t>
+              <a:t>Initialize on GitHub:</a:t>
             </a:r>
           </a:p>
           <a:p>
             <a:pPr lvl="1"/>
             <a:r>
               <a:rPr lang="en-US" smtClean="0"/>
-              <a:t>Settings, then Delete</a:t>
-            </a:r>
-          </a:p>
-          <a:p>
-            <a:r>
-              <a:rPr lang="en-US" smtClean="0"/>
-              <a:t>Deleting a local repo:</a:t>
+              <a:t>Create a repo on GitHub (with README)</a:t>
             </a:r>
           </a:p>
           <a:p>
             <a:pPr lvl="1"/>
             <a:r>
               <a:rPr lang="en-US" smtClean="0"/>
-              <a:t>Just delete the folder!</a:t>
-            </a:r>
-          </a:p>
-          <a:p>
-            <a:r>
-              <a:rPr lang="en-US" smtClean="0"/>
-              <a:t>Moving a local repo:</a:t>
+              <a:t>Clone to your local machine</a:t>
+            </a:r>
+          </a:p>
+          <a:p>
+            <a:r>
+              <a:rPr lang="en-US" smtClean="0"/>
+              <a:t>Initialize locally:</a:t>
             </a:r>
           </a:p>
           <a:p>
             <a:pPr lvl="1"/>
             <a:r>
               <a:rPr lang="en-US" smtClean="0"/>
-              <a:t>Just move the folder!</a:t>
-            </a:r>
+              <a:t>Initialize Git in existing local directory: </a:t>
+            </a:r>
+            <a:r>
+              <a:rPr lang="en-US" smtClean="0">
+                <a:solidFill>
+                  <a:srgbClr val="C00000"/>
+                </a:solidFill>
+              </a:rPr>
+              <a:t>git </a:t>
+            </a:r>
+            <a:r>
+              <a:rPr lang="en-US" err="1" smtClean="0">
+                <a:solidFill>
+                  <a:srgbClr val="C00000"/>
+                </a:solidFill>
+              </a:rPr>
+              <a:t>init</a:t>
+            </a:r>
+            <a:endParaRPr lang="en-US" smtClean="0">
+              <a:solidFill>
+                <a:srgbClr val="C00000"/>
+              </a:solidFill>
+            </a:endParaRPr>
+          </a:p>
+          <a:p>
+            <a:pPr lvl="1"/>
+            <a:r>
+              <a:rPr lang="en-US" smtClean="0"/>
+              <a:t>Create a repo on GitHub (without README)</a:t>
+            </a:r>
+          </a:p>
+          <a:p>
+            <a:pPr lvl="1"/>
+            <a:r>
+              <a:rPr lang="en-US" smtClean="0"/>
+              <a:t>Add remote: </a:t>
+            </a:r>
+            <a:r>
+              <a:rPr lang="en-US" smtClean="0">
+                <a:solidFill>
+                  <a:srgbClr val="C00000"/>
+                </a:solidFill>
+              </a:rPr>
+              <a:t>git remote add origin &lt;URL&gt;</a:t>
+            </a:r>
+          </a:p>
+          <a:p>
             <a:endParaRPr lang="en-US"/>
           </a:p>
         </p:txBody>
@@ -7134,7 +7188,7 @@
     </p:spTree>
     <p:extLst>
       <p:ext uri="{BB962C8B-B14F-4D97-AF65-F5344CB8AC3E}">
-        <p14:creationId xmlns:p14="http://schemas.microsoft.com/office/powerpoint/2010/main" val="910434589"/>
+        <p14:creationId xmlns:p14="http://schemas.microsoft.com/office/powerpoint/2010/main" val="1526738873"/>
       </p:ext>
     </p:extLst>
   </p:cSld>
@@ -7185,7 +7239,7 @@
           <a:p>
             <a:r>
               <a:rPr lang="en-US" smtClean="0"/>
-              <a:t>Excluding files from a repo</a:t>
+              <a:t>Deleting or moving a repo</a:t>
             </a:r>
             <a:endParaRPr lang="en-US"/>
           </a:p>
@@ -7208,106 +7262,40 @@
           <a:p>
             <a:r>
               <a:rPr lang="en-US" smtClean="0"/>
-              <a:t>Create a “.</a:t>
-            </a:r>
-            <a:r>
-              <a:rPr lang="en-US" err="1" smtClean="0"/>
-              <a:t>gitignore</a:t>
-            </a:r>
-            <a:r>
-              <a:rPr lang="en-US" smtClean="0"/>
-              <a:t>” file in your repo: </a:t>
-            </a:r>
-            <a:r>
-              <a:rPr lang="en-US" smtClean="0">
-                <a:solidFill>
-                  <a:srgbClr val="C00000"/>
-                </a:solidFill>
-              </a:rPr>
-              <a:t>touch .</a:t>
-            </a:r>
-            <a:r>
-              <a:rPr lang="en-US" err="1" smtClean="0">
-                <a:solidFill>
-                  <a:srgbClr val="C00000"/>
-                </a:solidFill>
-              </a:rPr>
-              <a:t>gitignore</a:t>
-            </a:r>
-            <a:endParaRPr lang="en-US" smtClean="0">
-              <a:solidFill>
-                <a:srgbClr val="C00000"/>
-              </a:solidFill>
-            </a:endParaRPr>
-          </a:p>
-          <a:p>
-            <a:r>
-              <a:rPr lang="en-US" smtClean="0"/>
-              <a:t>Specify exclusions, one per line:</a:t>
+              <a:t>Deleting a GitHub repo:</a:t>
             </a:r>
           </a:p>
           <a:p>
             <a:pPr lvl="1"/>
             <a:r>
               <a:rPr lang="en-US" smtClean="0"/>
-              <a:t>Single files: pip-log.txt</a:t>
+              <a:t>Settings, then Delete</a:t>
+            </a:r>
+          </a:p>
+          <a:p>
+            <a:r>
+              <a:rPr lang="en-US" smtClean="0"/>
+              <a:t>Deleting a local repo:</a:t>
             </a:r>
           </a:p>
           <a:p>
             <a:pPr lvl="1"/>
             <a:r>
               <a:rPr lang="en-US" smtClean="0"/>
-              <a:t>All files with a matching extension: *.</a:t>
-            </a:r>
-            <a:r>
-              <a:rPr lang="en-US" err="1" smtClean="0"/>
-              <a:t>pyc</a:t>
-            </a:r>
-            <a:endParaRPr lang="en-US" smtClean="0"/>
+              <a:t>Just delete the folder!</a:t>
+            </a:r>
+          </a:p>
+          <a:p>
+            <a:r>
+              <a:rPr lang="en-US" smtClean="0"/>
+              <a:t>Moving a local repo:</a:t>
+            </a:r>
           </a:p>
           <a:p>
             <a:pPr lvl="1"/>
             <a:r>
               <a:rPr lang="en-US" smtClean="0"/>
-              <a:t>Directories: </a:t>
-            </a:r>
-            <a:r>
-              <a:rPr lang="en-US" err="1" smtClean="0"/>
-              <a:t>env</a:t>
-            </a:r>
-            <a:r>
-              <a:rPr lang="en-US" smtClean="0"/>
-              <a:t>/</a:t>
-            </a:r>
-          </a:p>
-          <a:p>
-            <a:r>
-              <a:rPr lang="en-US"/>
-              <a:t>Templates: </a:t>
-            </a:r>
-            <a:r>
-              <a:rPr lang="en-US" smtClean="0">
-                <a:hlinkClick r:id="rId2"/>
-              </a:rPr>
-              <a:t>github.com/</a:t>
-            </a:r>
-            <a:r>
-              <a:rPr lang="en-US" err="1" smtClean="0">
-                <a:hlinkClick r:id="rId2"/>
-              </a:rPr>
-              <a:t>github</a:t>
-            </a:r>
-            <a:r>
-              <a:rPr lang="en-US" smtClean="0">
-                <a:hlinkClick r:id="rId2"/>
-              </a:rPr>
-              <a:t>/</a:t>
-            </a:r>
-            <a:r>
-              <a:rPr lang="en-US" err="1" smtClean="0">
-                <a:hlinkClick r:id="rId2"/>
-              </a:rPr>
-              <a:t>gitignore</a:t>
+              <a:t>Just move the folder!</a:t>
             </a:r>
             <a:endParaRPr lang="en-US"/>
           </a:p>
@@ -7316,7 +7304,7 @@
     </p:spTree>
     <p:extLst>
       <p:ext uri="{BB962C8B-B14F-4D97-AF65-F5344CB8AC3E}">
-        <p14:creationId xmlns:p14="http://schemas.microsoft.com/office/powerpoint/2010/main" val="487328359"/>
+        <p14:creationId xmlns:p14="http://schemas.microsoft.com/office/powerpoint/2010/main" val="910434589"/>
       </p:ext>
     </p:extLst>
   </p:cSld>
@@ -7366,6 +7354,188 @@
           <a:lstStyle/>
           <a:p>
             <a:r>
+              <a:rPr lang="en-US" smtClean="0"/>
+              <a:t>Excluding files from a repo</a:t>
+            </a:r>
+            <a:endParaRPr lang="en-US"/>
+          </a:p>
+        </p:txBody>
+      </p:sp>
+      <p:sp>
+        <p:nvSpPr>
+          <p:cNvPr id="3" name="Content Placeholder 2"/>
+          <p:cNvSpPr>
+            <a:spLocks noGrp="1"/>
+          </p:cNvSpPr>
+          <p:nvPr>
+            <p:ph idx="1"/>
+          </p:nvPr>
+        </p:nvSpPr>
+        <p:spPr/>
+        <p:txBody>
+          <a:bodyPr/>
+          <a:lstStyle/>
+          <a:p>
+            <a:r>
+              <a:rPr lang="en-US" smtClean="0"/>
+              <a:t>Create a “.</a:t>
+            </a:r>
+            <a:r>
+              <a:rPr lang="en-US" err="1" smtClean="0"/>
+              <a:t>gitignore</a:t>
+            </a:r>
+            <a:r>
+              <a:rPr lang="en-US" smtClean="0"/>
+              <a:t>” file in your repo: </a:t>
+            </a:r>
+            <a:r>
+              <a:rPr lang="en-US" smtClean="0">
+                <a:solidFill>
+                  <a:srgbClr val="C00000"/>
+                </a:solidFill>
+              </a:rPr>
+              <a:t>touch .</a:t>
+            </a:r>
+            <a:r>
+              <a:rPr lang="en-US" err="1" smtClean="0">
+                <a:solidFill>
+                  <a:srgbClr val="C00000"/>
+                </a:solidFill>
+              </a:rPr>
+              <a:t>gitignore</a:t>
+            </a:r>
+            <a:endParaRPr lang="en-US" smtClean="0">
+              <a:solidFill>
+                <a:srgbClr val="C00000"/>
+              </a:solidFill>
+            </a:endParaRPr>
+          </a:p>
+          <a:p>
+            <a:r>
+              <a:rPr lang="en-US" smtClean="0"/>
+              <a:t>Specify exclusions, one per line:</a:t>
+            </a:r>
+          </a:p>
+          <a:p>
+            <a:pPr lvl="1"/>
+            <a:r>
+              <a:rPr lang="en-US" smtClean="0"/>
+              <a:t>Single files: pip-log.txt</a:t>
+            </a:r>
+          </a:p>
+          <a:p>
+            <a:pPr lvl="1"/>
+            <a:r>
+              <a:rPr lang="en-US" smtClean="0"/>
+              <a:t>All files with a matching extension: *.</a:t>
+            </a:r>
+            <a:r>
+              <a:rPr lang="en-US" err="1" smtClean="0"/>
+              <a:t>pyc</a:t>
+            </a:r>
+            <a:endParaRPr lang="en-US" smtClean="0"/>
+          </a:p>
+          <a:p>
+            <a:pPr lvl="1"/>
+            <a:r>
+              <a:rPr lang="en-US" smtClean="0"/>
+              <a:t>Directories: </a:t>
+            </a:r>
+            <a:r>
+              <a:rPr lang="en-US" err="1" smtClean="0"/>
+              <a:t>env</a:t>
+            </a:r>
+            <a:r>
+              <a:rPr lang="en-US" smtClean="0"/>
+              <a:t>/</a:t>
+            </a:r>
+          </a:p>
+          <a:p>
+            <a:r>
+              <a:rPr lang="en-US"/>
+              <a:t>Templates: </a:t>
+            </a:r>
+            <a:r>
+              <a:rPr lang="en-US" smtClean="0">
+                <a:hlinkClick r:id="rId2"/>
+              </a:rPr>
+              <a:t>github.com/</a:t>
+            </a:r>
+            <a:r>
+              <a:rPr lang="en-US" err="1" smtClean="0">
+                <a:hlinkClick r:id="rId2"/>
+              </a:rPr>
+              <a:t>github</a:t>
+            </a:r>
+            <a:r>
+              <a:rPr lang="en-US" smtClean="0">
+                <a:hlinkClick r:id="rId2"/>
+              </a:rPr>
+              <a:t>/</a:t>
+            </a:r>
+            <a:r>
+              <a:rPr lang="en-US" err="1" smtClean="0">
+                <a:hlinkClick r:id="rId2"/>
+              </a:rPr>
+              <a:t>gitignore</a:t>
+            </a:r>
+            <a:endParaRPr lang="en-US"/>
+          </a:p>
+        </p:txBody>
+      </p:sp>
+    </p:spTree>
+    <p:extLst>
+      <p:ext uri="{BB962C8B-B14F-4D97-AF65-F5344CB8AC3E}">
+        <p14:creationId xmlns:p14="http://schemas.microsoft.com/office/powerpoint/2010/main" val="487328359"/>
+      </p:ext>
+    </p:extLst>
+  </p:cSld>
+  <p:clrMapOvr>
+    <a:masterClrMapping/>
+  </p:clrMapOvr>
+  <p:timing>
+    <p:tnLst>
+      <p:par>
+        <p:cTn id="1" dur="indefinite" restart="never" nodeType="tmRoot"/>
+      </p:par>
+    </p:tnLst>
+  </p:timing>
+</p:sld>
+</file>
+
+<file path=ppt/slides/slide35.xml><?xml version="1.0" encoding="utf-8"?>
+<p:sld xmlns:a="http://schemas.openxmlformats.org/drawingml/2006/main" xmlns:r="http://schemas.openxmlformats.org/officeDocument/2006/relationships" xmlns:p="http://schemas.openxmlformats.org/presentationml/2006/main">
+  <p:cSld>
+    <p:spTree>
+      <p:nvGrpSpPr>
+        <p:cNvPr id="1" name=""/>
+        <p:cNvGrpSpPr/>
+        <p:nvPr/>
+      </p:nvGrpSpPr>
+      <p:grpSpPr>
+        <a:xfrm>
+          <a:off x="0" y="0"/>
+          <a:ext cx="0" cy="0"/>
+          <a:chOff x="0" y="0"/>
+          <a:chExt cx="0" cy="0"/>
+        </a:xfrm>
+      </p:grpSpPr>
+      <p:sp>
+        <p:nvSpPr>
+          <p:cNvPr id="2" name="Title 1"/>
+          <p:cNvSpPr>
+            <a:spLocks noGrp="1"/>
+          </p:cNvSpPr>
+          <p:nvPr>
+            <p:ph type="title"/>
+          </p:nvPr>
+        </p:nvSpPr>
+        <p:spPr/>
+        <p:txBody>
+          <a:bodyPr/>
+          <a:lstStyle/>
+          <a:p>
+            <a:r>
               <a:rPr lang="en-US" err="1" smtClean="0"/>
               <a:t>Gists</a:t>
             </a:r>
@@ -7471,7 +7641,7 @@
 </p:sld>
 </file>
 
-<file path=ppt/slides/slide35.xml><?xml version="1.0" encoding="utf-8"?>
+<file path=ppt/slides/slide36.xml><?xml version="1.0" encoding="utf-8"?>
 <p:sld xmlns:a="http://schemas.openxmlformats.org/drawingml/2006/main" xmlns:r="http://schemas.openxmlformats.org/officeDocument/2006/relationships" xmlns:p="http://schemas.openxmlformats.org/presentationml/2006/main">
   <p:cSld>
     <p:spTree>

</xml_diff>